<commit_message>
add api doc for game room
</commit_message>
<xml_diff>
--- a/api-doc/design.pptx
+++ b/api-doc/design.pptx
@@ -109,6 +109,11 @@
       </a:defRPr>
     </a:lvl9pPr>
   </p:defaultTextStyle>
+  <p:extLst>
+    <p:ext uri="{EFAFB233-063F-42B5-8137-9DF3F51BA10A}">
+      <p15:sldGuideLst xmlns:p15="http://schemas.microsoft.com/office/powerpoint/2012/main"/>
+    </p:ext>
+  </p:extLst>
 </p:presentation>
 </file>
 
@@ -194,7 +199,7 @@
           <a:p>
             <a:fld id="{A330B505-D851-FA45-8154-3CDDF7BD6D15}" type="datetimeFigureOut">
               <a:rPr kumimoji="1" lang="ja-JP" altLang="en-US" smtClean="0"/>
-              <a:t>2017/7/27</a:t>
+              <a:t>2017/7/29</a:t>
             </a:fld>
             <a:endParaRPr kumimoji="1" lang="ja-JP" altLang="en-US"/>
           </a:p>
@@ -625,7 +630,7 @@
           <a:p>
             <a:fld id="{E86270BF-6DAF-5E49-96E7-838ACBFEC869}" type="datetimeFigureOut">
               <a:rPr kumimoji="1" lang="ja-JP" altLang="en-US" smtClean="0"/>
-              <a:t>2017/7/27</a:t>
+              <a:t>2017/7/29</a:t>
             </a:fld>
             <a:endParaRPr kumimoji="1" lang="ja-JP" altLang="en-US"/>
           </a:p>
@@ -827,7 +832,7 @@
           <a:p>
             <a:fld id="{E86270BF-6DAF-5E49-96E7-838ACBFEC869}" type="datetimeFigureOut">
               <a:rPr kumimoji="1" lang="ja-JP" altLang="en-US" smtClean="0"/>
-              <a:t>2017/7/27</a:t>
+              <a:t>2017/7/29</a:t>
             </a:fld>
             <a:endParaRPr kumimoji="1" lang="ja-JP" altLang="en-US"/>
           </a:p>
@@ -1039,7 +1044,7 @@
           <a:p>
             <a:fld id="{E86270BF-6DAF-5E49-96E7-838ACBFEC869}" type="datetimeFigureOut">
               <a:rPr kumimoji="1" lang="ja-JP" altLang="en-US" smtClean="0"/>
-              <a:t>2017/7/27</a:t>
+              <a:t>2017/7/29</a:t>
             </a:fld>
             <a:endParaRPr kumimoji="1" lang="ja-JP" altLang="en-US"/>
           </a:p>
@@ -1241,7 +1246,7 @@
           <a:p>
             <a:fld id="{E86270BF-6DAF-5E49-96E7-838ACBFEC869}" type="datetimeFigureOut">
               <a:rPr kumimoji="1" lang="ja-JP" altLang="en-US" smtClean="0"/>
-              <a:t>2017/7/27</a:t>
+              <a:t>2017/7/29</a:t>
             </a:fld>
             <a:endParaRPr kumimoji="1" lang="ja-JP" altLang="en-US"/>
           </a:p>
@@ -1487,7 +1492,7 @@
           <a:p>
             <a:fld id="{E86270BF-6DAF-5E49-96E7-838ACBFEC869}" type="datetimeFigureOut">
               <a:rPr kumimoji="1" lang="ja-JP" altLang="en-US" smtClean="0"/>
-              <a:t>2017/7/27</a:t>
+              <a:t>2017/7/29</a:t>
             </a:fld>
             <a:endParaRPr kumimoji="1" lang="ja-JP" altLang="en-US"/>
           </a:p>
@@ -1783,7 +1788,7 @@
           <a:p>
             <a:fld id="{E86270BF-6DAF-5E49-96E7-838ACBFEC869}" type="datetimeFigureOut">
               <a:rPr kumimoji="1" lang="ja-JP" altLang="en-US" smtClean="0"/>
-              <a:t>2017/7/27</a:t>
+              <a:t>2017/7/29</a:t>
             </a:fld>
             <a:endParaRPr kumimoji="1" lang="ja-JP" altLang="en-US"/>
           </a:p>
@@ -2214,7 +2219,7 @@
           <a:p>
             <a:fld id="{E86270BF-6DAF-5E49-96E7-838ACBFEC869}" type="datetimeFigureOut">
               <a:rPr kumimoji="1" lang="ja-JP" altLang="en-US" smtClean="0"/>
-              <a:t>2017/7/27</a:t>
+              <a:t>2017/7/29</a:t>
             </a:fld>
             <a:endParaRPr kumimoji="1" lang="ja-JP" altLang="en-US"/>
           </a:p>
@@ -2332,7 +2337,7 @@
           <a:p>
             <a:fld id="{E86270BF-6DAF-5E49-96E7-838ACBFEC869}" type="datetimeFigureOut">
               <a:rPr kumimoji="1" lang="ja-JP" altLang="en-US" smtClean="0"/>
-              <a:t>2017/7/27</a:t>
+              <a:t>2017/7/29</a:t>
             </a:fld>
             <a:endParaRPr kumimoji="1" lang="ja-JP" altLang="en-US"/>
           </a:p>
@@ -2427,7 +2432,7 @@
           <a:p>
             <a:fld id="{E86270BF-6DAF-5E49-96E7-838ACBFEC869}" type="datetimeFigureOut">
               <a:rPr kumimoji="1" lang="ja-JP" altLang="en-US" smtClean="0"/>
-              <a:t>2017/7/27</a:t>
+              <a:t>2017/7/29</a:t>
             </a:fld>
             <a:endParaRPr kumimoji="1" lang="ja-JP" altLang="en-US"/>
           </a:p>
@@ -2736,7 +2741,7 @@
           <a:p>
             <a:fld id="{E86270BF-6DAF-5E49-96E7-838ACBFEC869}" type="datetimeFigureOut">
               <a:rPr kumimoji="1" lang="ja-JP" altLang="en-US" smtClean="0"/>
-              <a:t>2017/7/27</a:t>
+              <a:t>2017/7/29</a:t>
             </a:fld>
             <a:endParaRPr kumimoji="1" lang="ja-JP" altLang="en-US"/>
           </a:p>
@@ -2989,7 +2994,7 @@
           <a:p>
             <a:fld id="{E86270BF-6DAF-5E49-96E7-838ACBFEC869}" type="datetimeFigureOut">
               <a:rPr kumimoji="1" lang="ja-JP" altLang="en-US" smtClean="0"/>
-              <a:t>2017/7/27</a:t>
+              <a:t>2017/7/29</a:t>
             </a:fld>
             <a:endParaRPr kumimoji="1" lang="ja-JP" altLang="en-US"/>
           </a:p>
@@ -3234,7 +3239,7 @@
           <a:p>
             <a:fld id="{E86270BF-6DAF-5E49-96E7-838ACBFEC869}" type="datetimeFigureOut">
               <a:rPr kumimoji="1" lang="ja-JP" altLang="en-US" smtClean="0"/>
-              <a:t>2017/7/27</a:t>
+              <a:t>2017/7/29</a:t>
             </a:fld>
             <a:endParaRPr kumimoji="1" lang="ja-JP" altLang="en-US"/>
           </a:p>
@@ -4245,482 +4250,6 @@
           <a:p>
             <a:pPr algn="ctr"/>
             <a:endParaRPr kumimoji="1" lang="ja-JP" altLang="en-US"/>
-          </a:p>
-        </p:txBody>
-      </p:sp>
-      <p:sp>
-        <p:nvSpPr>
-          <p:cNvPr id="27" name="正方形/長方形 26"/>
-          <p:cNvSpPr/>
-          <p:nvPr/>
-        </p:nvSpPr>
-        <p:spPr>
-          <a:xfrm>
-            <a:off x="9273668" y="9095621"/>
-            <a:ext cx="2766894" cy="2844687"/>
-          </a:xfrm>
-          <a:prstGeom prst="rect">
-            <a:avLst/>
-          </a:prstGeom>
-          <a:noFill/>
-          <a:ln>
-            <a:solidFill>
-              <a:schemeClr val="bg1">
-                <a:lumMod val="65000"/>
-              </a:schemeClr>
-            </a:solidFill>
-            <a:prstDash val="dash"/>
-          </a:ln>
-        </p:spPr>
-        <p:style>
-          <a:lnRef idx="2">
-            <a:schemeClr val="accent1">
-              <a:shade val="50000"/>
-            </a:schemeClr>
-          </a:lnRef>
-          <a:fillRef idx="1">
-            <a:schemeClr val="accent1"/>
-          </a:fillRef>
-          <a:effectRef idx="0">
-            <a:schemeClr val="accent1"/>
-          </a:effectRef>
-          <a:fontRef idx="minor">
-            <a:schemeClr val="lt1"/>
-          </a:fontRef>
-        </p:style>
-        <p:txBody>
-          <a:bodyPr rtlCol="0" anchor="ctr"/>
-          <a:lstStyle/>
-          <a:p>
-            <a:pPr algn="ctr"/>
-            <a:endParaRPr kumimoji="1" lang="ja-JP" altLang="en-US"/>
-          </a:p>
-        </p:txBody>
-      </p:sp>
-      <p:sp>
-        <p:nvSpPr>
-          <p:cNvPr id="28" name="角丸四角形 27"/>
-          <p:cNvSpPr/>
-          <p:nvPr/>
-        </p:nvSpPr>
-        <p:spPr>
-          <a:xfrm>
-            <a:off x="10208481" y="10099033"/>
-            <a:ext cx="1294105" cy="674913"/>
-          </a:xfrm>
-          <a:prstGeom prst="roundRect">
-            <a:avLst/>
-          </a:prstGeom>
-        </p:spPr>
-        <p:style>
-          <a:lnRef idx="2">
-            <a:schemeClr val="accent1">
-              <a:shade val="50000"/>
-            </a:schemeClr>
-          </a:lnRef>
-          <a:fillRef idx="1">
-            <a:schemeClr val="accent1"/>
-          </a:fillRef>
-          <a:effectRef idx="0">
-            <a:schemeClr val="accent1"/>
-          </a:effectRef>
-          <a:fontRef idx="minor">
-            <a:schemeClr val="lt1"/>
-          </a:fontRef>
-        </p:style>
-        <p:txBody>
-          <a:bodyPr rtlCol="0" anchor="ctr"/>
-          <a:lstStyle/>
-          <a:p>
-            <a:pPr algn="ctr"/>
-            <a:endParaRPr kumimoji="1" lang="ja-JP" altLang="en-US"/>
-          </a:p>
-        </p:txBody>
-      </p:sp>
-      <p:sp>
-        <p:nvSpPr>
-          <p:cNvPr id="29" name="テキスト ボックス 28"/>
-          <p:cNvSpPr txBox="1"/>
-          <p:nvPr/>
-        </p:nvSpPr>
-        <p:spPr>
-          <a:xfrm>
-            <a:off x="9273667" y="9095621"/>
-            <a:ext cx="1301299" cy="307777"/>
-          </a:xfrm>
-          <a:prstGeom prst="rect">
-            <a:avLst/>
-          </a:prstGeom>
-          <a:noFill/>
-        </p:spPr>
-        <p:txBody>
-          <a:bodyPr wrap="square" rtlCol="0">
-            <a:spAutoFit/>
-          </a:bodyPr>
-          <a:lstStyle/>
-          <a:p>
-            <a:r>
-              <a:rPr lang="ja-JP" altLang="en-US" sz="1400" dirty="0" smtClean="0"/>
-              <a:t>リザルト画面</a:t>
-            </a:r>
-            <a:endParaRPr kumimoji="1" lang="ja-JP" altLang="en-US" sz="1400" dirty="0"/>
-          </a:p>
-        </p:txBody>
-      </p:sp>
-      <p:sp>
-        <p:nvSpPr>
-          <p:cNvPr id="33" name="正方形/長方形 32"/>
-          <p:cNvSpPr/>
-          <p:nvPr/>
-        </p:nvSpPr>
-        <p:spPr>
-          <a:xfrm>
-            <a:off x="6207662" y="9095621"/>
-            <a:ext cx="2766894" cy="2844687"/>
-          </a:xfrm>
-          <a:prstGeom prst="rect">
-            <a:avLst/>
-          </a:prstGeom>
-          <a:noFill/>
-          <a:ln>
-            <a:solidFill>
-              <a:schemeClr val="bg1">
-                <a:lumMod val="65000"/>
-              </a:schemeClr>
-            </a:solidFill>
-            <a:prstDash val="dash"/>
-          </a:ln>
-        </p:spPr>
-        <p:style>
-          <a:lnRef idx="2">
-            <a:schemeClr val="accent1">
-              <a:shade val="50000"/>
-            </a:schemeClr>
-          </a:lnRef>
-          <a:fillRef idx="1">
-            <a:schemeClr val="accent1"/>
-          </a:fillRef>
-          <a:effectRef idx="0">
-            <a:schemeClr val="accent1"/>
-          </a:effectRef>
-          <a:fontRef idx="minor">
-            <a:schemeClr val="lt1"/>
-          </a:fontRef>
-        </p:style>
-        <p:txBody>
-          <a:bodyPr rtlCol="0" anchor="ctr"/>
-          <a:lstStyle/>
-          <a:p>
-            <a:pPr algn="ctr"/>
-            <a:endParaRPr kumimoji="1" lang="ja-JP" altLang="en-US"/>
-          </a:p>
-        </p:txBody>
-      </p:sp>
-      <p:sp>
-        <p:nvSpPr>
-          <p:cNvPr id="34" name="角丸四角形 33"/>
-          <p:cNvSpPr/>
-          <p:nvPr/>
-        </p:nvSpPr>
-        <p:spPr>
-          <a:xfrm>
-            <a:off x="7142475" y="10099033"/>
-            <a:ext cx="1294105" cy="674913"/>
-          </a:xfrm>
-          <a:prstGeom prst="roundRect">
-            <a:avLst/>
-          </a:prstGeom>
-        </p:spPr>
-        <p:style>
-          <a:lnRef idx="2">
-            <a:schemeClr val="accent1">
-              <a:shade val="50000"/>
-            </a:schemeClr>
-          </a:lnRef>
-          <a:fillRef idx="1">
-            <a:schemeClr val="accent1"/>
-          </a:fillRef>
-          <a:effectRef idx="0">
-            <a:schemeClr val="accent1"/>
-          </a:effectRef>
-          <a:fontRef idx="minor">
-            <a:schemeClr val="lt1"/>
-          </a:fontRef>
-        </p:style>
-        <p:txBody>
-          <a:bodyPr rtlCol="0" anchor="ctr"/>
-          <a:lstStyle/>
-          <a:p>
-            <a:pPr algn="ctr"/>
-            <a:endParaRPr kumimoji="1" lang="ja-JP" altLang="en-US"/>
-          </a:p>
-        </p:txBody>
-      </p:sp>
-      <p:sp>
-        <p:nvSpPr>
-          <p:cNvPr id="35" name="テキスト ボックス 34"/>
-          <p:cNvSpPr txBox="1"/>
-          <p:nvPr/>
-        </p:nvSpPr>
-        <p:spPr>
-          <a:xfrm>
-            <a:off x="6207660" y="9095621"/>
-            <a:ext cx="1268643" cy="307777"/>
-          </a:xfrm>
-          <a:prstGeom prst="rect">
-            <a:avLst/>
-          </a:prstGeom>
-          <a:noFill/>
-        </p:spPr>
-        <p:txBody>
-          <a:bodyPr wrap="square" rtlCol="0">
-            <a:spAutoFit/>
-          </a:bodyPr>
-          <a:lstStyle/>
-          <a:p>
-            <a:r>
-              <a:rPr lang="ja-JP" altLang="en-US" sz="1400" dirty="0" smtClean="0"/>
-              <a:t>ゲーム画面</a:t>
-            </a:r>
-            <a:endParaRPr kumimoji="1" lang="ja-JP" altLang="en-US" sz="1400" dirty="0"/>
-          </a:p>
-        </p:txBody>
-      </p:sp>
-      <p:sp>
-        <p:nvSpPr>
-          <p:cNvPr id="36" name="正方形/長方形 35"/>
-          <p:cNvSpPr/>
-          <p:nvPr/>
-        </p:nvSpPr>
-        <p:spPr>
-          <a:xfrm>
-            <a:off x="3141654" y="9095621"/>
-            <a:ext cx="2766894" cy="2844687"/>
-          </a:xfrm>
-          <a:prstGeom prst="rect">
-            <a:avLst/>
-          </a:prstGeom>
-          <a:noFill/>
-          <a:ln>
-            <a:solidFill>
-              <a:schemeClr val="bg1">
-                <a:lumMod val="65000"/>
-              </a:schemeClr>
-            </a:solidFill>
-            <a:prstDash val="dash"/>
-          </a:ln>
-        </p:spPr>
-        <p:style>
-          <a:lnRef idx="2">
-            <a:schemeClr val="accent1">
-              <a:shade val="50000"/>
-            </a:schemeClr>
-          </a:lnRef>
-          <a:fillRef idx="1">
-            <a:schemeClr val="accent1"/>
-          </a:fillRef>
-          <a:effectRef idx="0">
-            <a:schemeClr val="accent1"/>
-          </a:effectRef>
-          <a:fontRef idx="minor">
-            <a:schemeClr val="lt1"/>
-          </a:fontRef>
-        </p:style>
-        <p:txBody>
-          <a:bodyPr rtlCol="0" anchor="ctr"/>
-          <a:lstStyle/>
-          <a:p>
-            <a:pPr algn="ctr"/>
-            <a:endParaRPr kumimoji="1" lang="ja-JP" altLang="en-US"/>
-          </a:p>
-        </p:txBody>
-      </p:sp>
-      <p:sp>
-        <p:nvSpPr>
-          <p:cNvPr id="37" name="角丸四角形 36"/>
-          <p:cNvSpPr/>
-          <p:nvPr/>
-        </p:nvSpPr>
-        <p:spPr>
-          <a:xfrm>
-            <a:off x="4076467" y="10099033"/>
-            <a:ext cx="1294105" cy="674913"/>
-          </a:xfrm>
-          <a:prstGeom prst="roundRect">
-            <a:avLst/>
-          </a:prstGeom>
-        </p:spPr>
-        <p:style>
-          <a:lnRef idx="2">
-            <a:schemeClr val="accent1">
-              <a:shade val="50000"/>
-            </a:schemeClr>
-          </a:lnRef>
-          <a:fillRef idx="1">
-            <a:schemeClr val="accent1"/>
-          </a:fillRef>
-          <a:effectRef idx="0">
-            <a:schemeClr val="accent1"/>
-          </a:effectRef>
-          <a:fontRef idx="minor">
-            <a:schemeClr val="lt1"/>
-          </a:fontRef>
-        </p:style>
-        <p:txBody>
-          <a:bodyPr rtlCol="0" anchor="ctr"/>
-          <a:lstStyle/>
-          <a:p>
-            <a:pPr algn="ctr"/>
-            <a:endParaRPr kumimoji="1" lang="ja-JP" altLang="en-US"/>
-          </a:p>
-        </p:txBody>
-      </p:sp>
-      <p:sp>
-        <p:nvSpPr>
-          <p:cNvPr id="38" name="テキスト ボックス 37"/>
-          <p:cNvSpPr txBox="1"/>
-          <p:nvPr/>
-        </p:nvSpPr>
-        <p:spPr>
-          <a:xfrm>
-            <a:off x="3141653" y="9095621"/>
-            <a:ext cx="1522294" cy="307777"/>
-          </a:xfrm>
-          <a:prstGeom prst="rect">
-            <a:avLst/>
-          </a:prstGeom>
-          <a:noFill/>
-        </p:spPr>
-        <p:txBody>
-          <a:bodyPr wrap="square" rtlCol="0">
-            <a:spAutoFit/>
-          </a:bodyPr>
-          <a:lstStyle/>
-          <a:p>
-            <a:r>
-              <a:rPr lang="ja-JP" altLang="en-US" sz="1400" dirty="0" smtClean="0"/>
-              <a:t>マッチング画面</a:t>
-            </a:r>
-            <a:endParaRPr kumimoji="1" lang="ja-JP" altLang="en-US" sz="1400" dirty="0"/>
-          </a:p>
-        </p:txBody>
-      </p:sp>
-      <p:sp>
-        <p:nvSpPr>
-          <p:cNvPr id="39" name="正方形/長方形 38"/>
-          <p:cNvSpPr/>
-          <p:nvPr/>
-        </p:nvSpPr>
-        <p:spPr>
-          <a:xfrm>
-            <a:off x="75645" y="9095621"/>
-            <a:ext cx="2766894" cy="2844687"/>
-          </a:xfrm>
-          <a:prstGeom prst="rect">
-            <a:avLst/>
-          </a:prstGeom>
-          <a:noFill/>
-          <a:ln>
-            <a:solidFill>
-              <a:schemeClr val="bg1">
-                <a:lumMod val="65000"/>
-              </a:schemeClr>
-            </a:solidFill>
-            <a:prstDash val="dash"/>
-          </a:ln>
-        </p:spPr>
-        <p:style>
-          <a:lnRef idx="2">
-            <a:schemeClr val="accent1">
-              <a:shade val="50000"/>
-            </a:schemeClr>
-          </a:lnRef>
-          <a:fillRef idx="1">
-            <a:schemeClr val="accent1"/>
-          </a:fillRef>
-          <a:effectRef idx="0">
-            <a:schemeClr val="accent1"/>
-          </a:effectRef>
-          <a:fontRef idx="minor">
-            <a:schemeClr val="lt1"/>
-          </a:fontRef>
-        </p:style>
-        <p:txBody>
-          <a:bodyPr rtlCol="0" anchor="ctr"/>
-          <a:lstStyle/>
-          <a:p>
-            <a:pPr algn="ctr"/>
-            <a:endParaRPr kumimoji="1" lang="ja-JP" altLang="en-US"/>
-          </a:p>
-        </p:txBody>
-      </p:sp>
-      <p:sp>
-        <p:nvSpPr>
-          <p:cNvPr id="40" name="角丸四角形 39"/>
-          <p:cNvSpPr/>
-          <p:nvPr/>
-        </p:nvSpPr>
-        <p:spPr>
-          <a:xfrm>
-            <a:off x="1010458" y="10099033"/>
-            <a:ext cx="1294105" cy="674913"/>
-          </a:xfrm>
-          <a:prstGeom prst="roundRect">
-            <a:avLst/>
-          </a:prstGeom>
-        </p:spPr>
-        <p:style>
-          <a:lnRef idx="2">
-            <a:schemeClr val="accent1">
-              <a:shade val="50000"/>
-            </a:schemeClr>
-          </a:lnRef>
-          <a:fillRef idx="1">
-            <a:schemeClr val="accent1"/>
-          </a:fillRef>
-          <a:effectRef idx="0">
-            <a:schemeClr val="accent1"/>
-          </a:effectRef>
-          <a:fontRef idx="minor">
-            <a:schemeClr val="lt1"/>
-          </a:fontRef>
-        </p:style>
-        <p:txBody>
-          <a:bodyPr rtlCol="0" anchor="ctr"/>
-          <a:lstStyle/>
-          <a:p>
-            <a:pPr algn="ctr"/>
-            <a:endParaRPr kumimoji="1" lang="ja-JP" altLang="en-US"/>
-          </a:p>
-        </p:txBody>
-      </p:sp>
-      <p:sp>
-        <p:nvSpPr>
-          <p:cNvPr id="41" name="テキスト ボックス 40"/>
-          <p:cNvSpPr txBox="1"/>
-          <p:nvPr/>
-        </p:nvSpPr>
-        <p:spPr>
-          <a:xfrm>
-            <a:off x="75644" y="9095621"/>
-            <a:ext cx="1522294" cy="307777"/>
-          </a:xfrm>
-          <a:prstGeom prst="rect">
-            <a:avLst/>
-          </a:prstGeom>
-          <a:noFill/>
-        </p:spPr>
-        <p:txBody>
-          <a:bodyPr wrap="square" rtlCol="0">
-            <a:spAutoFit/>
-          </a:bodyPr>
-          <a:lstStyle/>
-          <a:p>
-            <a:r>
-              <a:rPr lang="ja-JP" altLang="en-US" sz="1400" dirty="0" smtClean="0"/>
-              <a:t>ガチャ画面</a:t>
-            </a:r>
-            <a:endParaRPr kumimoji="1" lang="ja-JP" altLang="en-US" sz="1400" dirty="0"/>
           </a:p>
         </p:txBody>
       </p:sp>

</xml_diff>

<commit_message>
add doc for gameplay
</commit_message>
<xml_diff>
--- a/api-doc/design.pptx
+++ b/api-doc/design.pptx
@@ -7374,7 +7374,7 @@
           <p:cNvPr id="4" name="正方形/長方形 3">
             <a:extLst>
               <a:ext uri="{FF2B5EF4-FFF2-40B4-BE49-F238E27FC236}">
-                <a16:creationId xmlns:a16="http://schemas.microsoft.com/office/drawing/2014/main" xmlns="" id="{1F01B099-C328-466C-A2FD-A26BCB38ECEE}"/>
+                <a16:creationId xmlns="" xmlns:a16="http://schemas.microsoft.com/office/drawing/2014/main" id="{1F01B099-C328-466C-A2FD-A26BCB38ECEE}"/>
               </a:ext>
             </a:extLst>
           </p:cNvPr>
@@ -7428,7 +7428,7 @@
           <p:cNvPr id="6" name="楕円 6">
             <a:extLst>
               <a:ext uri="{FF2B5EF4-FFF2-40B4-BE49-F238E27FC236}">
-                <a16:creationId xmlns:a16="http://schemas.microsoft.com/office/drawing/2014/main" xmlns="" id="{C1EB3A8E-2720-437B-B422-11CD196A538F}"/>
+                <a16:creationId xmlns="" xmlns:a16="http://schemas.microsoft.com/office/drawing/2014/main" id="{C1EB3A8E-2720-437B-B422-11CD196A538F}"/>
               </a:ext>
             </a:extLst>
           </p:cNvPr>
@@ -7482,7 +7482,7 @@
           <p:cNvPr id="8" name="楕円 11">
             <a:extLst>
               <a:ext uri="{FF2B5EF4-FFF2-40B4-BE49-F238E27FC236}">
-                <a16:creationId xmlns:a16="http://schemas.microsoft.com/office/drawing/2014/main" xmlns="" id="{D33C16D6-EDF8-445E-9D80-E54AFD905908}"/>
+                <a16:creationId xmlns="" xmlns:a16="http://schemas.microsoft.com/office/drawing/2014/main" id="{D33C16D6-EDF8-445E-9D80-E54AFD905908}"/>
               </a:ext>
             </a:extLst>
           </p:cNvPr>
@@ -7536,7 +7536,7 @@
           <p:cNvPr id="9" name="正方形/長方形 8">
             <a:extLst>
               <a:ext uri="{FF2B5EF4-FFF2-40B4-BE49-F238E27FC236}">
-                <a16:creationId xmlns:a16="http://schemas.microsoft.com/office/drawing/2014/main" xmlns="" id="{98ECB669-E1E9-4D3D-902B-6B33A20EAE63}"/>
+                <a16:creationId xmlns="" xmlns:a16="http://schemas.microsoft.com/office/drawing/2014/main" id="{98ECB669-E1E9-4D3D-902B-6B33A20EAE63}"/>
               </a:ext>
             </a:extLst>
           </p:cNvPr>
@@ -7599,7 +7599,7 @@
             <p:cNvPr id="10" name="楕円 16">
               <a:extLst>
                 <a:ext uri="{FF2B5EF4-FFF2-40B4-BE49-F238E27FC236}">
-                  <a16:creationId xmlns:a16="http://schemas.microsoft.com/office/drawing/2014/main" xmlns="" id="{BA6516FE-57B7-42D6-B2D5-19345392BC8A}"/>
+                  <a16:creationId xmlns="" xmlns:a16="http://schemas.microsoft.com/office/drawing/2014/main" id="{BA6516FE-57B7-42D6-B2D5-19345392BC8A}"/>
                 </a:ext>
               </a:extLst>
             </p:cNvPr>
@@ -7670,7 +7670,7 @@
               <p:cNvPr id="11" name="直線コネクタ 10">
                 <a:extLst>
                   <a:ext uri="{FF2B5EF4-FFF2-40B4-BE49-F238E27FC236}">
-                    <a16:creationId xmlns:a16="http://schemas.microsoft.com/office/drawing/2014/main" xmlns="" id="{4627F8E9-976F-4ADC-9614-EA9B21AEBACD}"/>
+                    <a16:creationId xmlns="" xmlns:a16="http://schemas.microsoft.com/office/drawing/2014/main" id="{4627F8E9-976F-4ADC-9614-EA9B21AEBACD}"/>
                   </a:ext>
                 </a:extLst>
               </p:cNvPr>
@@ -7713,7 +7713,7 @@
               <p:cNvPr id="12" name="直線コネクタ 11">
                 <a:extLst>
                   <a:ext uri="{FF2B5EF4-FFF2-40B4-BE49-F238E27FC236}">
-                    <a16:creationId xmlns:a16="http://schemas.microsoft.com/office/drawing/2014/main" xmlns="" id="{96FF28A2-B3D7-4419-9F2C-1D544A351302}"/>
+                    <a16:creationId xmlns="" xmlns:a16="http://schemas.microsoft.com/office/drawing/2014/main" id="{96FF28A2-B3D7-4419-9F2C-1D544A351302}"/>
                   </a:ext>
                 </a:extLst>
               </p:cNvPr>
@@ -7756,7 +7756,7 @@
               <p:cNvPr id="13" name="直線コネクタ 12">
                 <a:extLst>
                   <a:ext uri="{FF2B5EF4-FFF2-40B4-BE49-F238E27FC236}">
-                    <a16:creationId xmlns:a16="http://schemas.microsoft.com/office/drawing/2014/main" xmlns="" id="{CFF9112A-A93F-4D9A-BD86-51365CE1D3C6}"/>
+                    <a16:creationId xmlns="" xmlns:a16="http://schemas.microsoft.com/office/drawing/2014/main" id="{CFF9112A-A93F-4D9A-BD86-51365CE1D3C6}"/>
                   </a:ext>
                 </a:extLst>
               </p:cNvPr>
@@ -7815,7 +7815,7 @@
             <p:cNvPr id="18" name="楕円 47">
               <a:extLst>
                 <a:ext uri="{FF2B5EF4-FFF2-40B4-BE49-F238E27FC236}">
-                  <a16:creationId xmlns:a16="http://schemas.microsoft.com/office/drawing/2014/main" xmlns="" id="{9FA2D738-B571-41B9-B2D4-0ABE45B6D764}"/>
+                  <a16:creationId xmlns="" xmlns:a16="http://schemas.microsoft.com/office/drawing/2014/main" id="{9FA2D738-B571-41B9-B2D4-0ABE45B6D764}"/>
                 </a:ext>
               </a:extLst>
             </p:cNvPr>
@@ -7872,7 +7872,7 @@
             <p:cNvPr id="19" name="直線コネクタ 18">
               <a:extLst>
                 <a:ext uri="{FF2B5EF4-FFF2-40B4-BE49-F238E27FC236}">
-                  <a16:creationId xmlns:a16="http://schemas.microsoft.com/office/drawing/2014/main" xmlns="" id="{232E929E-676B-4082-BAB2-9FD907DA6F93}"/>
+                  <a16:creationId xmlns="" xmlns:a16="http://schemas.microsoft.com/office/drawing/2014/main" id="{232E929E-676B-4082-BAB2-9FD907DA6F93}"/>
                 </a:ext>
               </a:extLst>
             </p:cNvPr>
@@ -7915,7 +7915,7 @@
             <p:cNvPr id="20" name="直線コネクタ 19">
               <a:extLst>
                 <a:ext uri="{FF2B5EF4-FFF2-40B4-BE49-F238E27FC236}">
-                  <a16:creationId xmlns:a16="http://schemas.microsoft.com/office/drawing/2014/main" xmlns="" id="{1C445AD3-AB18-41E5-8B0E-F7CAAF01A507}"/>
+                  <a16:creationId xmlns="" xmlns:a16="http://schemas.microsoft.com/office/drawing/2014/main" id="{1C445AD3-AB18-41E5-8B0E-F7CAAF01A507}"/>
                 </a:ext>
               </a:extLst>
             </p:cNvPr>
@@ -7958,7 +7958,7 @@
             <p:cNvPr id="21" name="直線コネクタ 20">
               <a:extLst>
                 <a:ext uri="{FF2B5EF4-FFF2-40B4-BE49-F238E27FC236}">
-                  <a16:creationId xmlns:a16="http://schemas.microsoft.com/office/drawing/2014/main" xmlns="" id="{34CCF804-2773-4E1A-9C5B-0410707057C4}"/>
+                  <a16:creationId xmlns="" xmlns:a16="http://schemas.microsoft.com/office/drawing/2014/main" id="{34CCF804-2773-4E1A-9C5B-0410707057C4}"/>
                 </a:ext>
               </a:extLst>
             </p:cNvPr>
@@ -8002,7 +8002,7 @@
           <p:cNvPr id="27" name="テキスト ボックス 26">
             <a:extLst>
               <a:ext uri="{FF2B5EF4-FFF2-40B4-BE49-F238E27FC236}">
-                <a16:creationId xmlns:a16="http://schemas.microsoft.com/office/drawing/2014/main" xmlns="" id="{9D18E596-0ACF-4B77-AED2-DB44F31E81E4}"/>
+                <a16:creationId xmlns="" xmlns:a16="http://schemas.microsoft.com/office/drawing/2014/main" id="{9D18E596-0ACF-4B77-AED2-DB44F31E81E4}"/>
               </a:ext>
             </a:extLst>
           </p:cNvPr>
@@ -8046,7 +8046,7 @@
           <p:cNvPr id="28" name="正方形/長方形 27">
             <a:extLst>
               <a:ext uri="{FF2B5EF4-FFF2-40B4-BE49-F238E27FC236}">
-                <a16:creationId xmlns:a16="http://schemas.microsoft.com/office/drawing/2014/main" xmlns="" id="{253FC7D4-72E0-4703-84F1-0162AD7B0135}"/>
+                <a16:creationId xmlns="" xmlns:a16="http://schemas.microsoft.com/office/drawing/2014/main" id="{253FC7D4-72E0-4703-84F1-0162AD7B0135}"/>
               </a:ext>
             </a:extLst>
           </p:cNvPr>
@@ -8114,7 +8114,7 @@
             <p:cNvPr id="38" name="正方形/長方形 37">
               <a:extLst>
                 <a:ext uri="{FF2B5EF4-FFF2-40B4-BE49-F238E27FC236}">
-                  <a16:creationId xmlns:a16="http://schemas.microsoft.com/office/drawing/2014/main" xmlns="" id="{51D940FE-50CF-49CD-AC89-0B4E1B5E6049}"/>
+                  <a16:creationId xmlns="" xmlns:a16="http://schemas.microsoft.com/office/drawing/2014/main" id="{51D940FE-50CF-49CD-AC89-0B4E1B5E6049}"/>
                 </a:ext>
               </a:extLst>
             </p:cNvPr>
@@ -8174,7 +8174,7 @@
             <p:cNvPr id="39" name="正方形/長方形 38">
               <a:extLst>
                 <a:ext uri="{FF2B5EF4-FFF2-40B4-BE49-F238E27FC236}">
-                  <a16:creationId xmlns:a16="http://schemas.microsoft.com/office/drawing/2014/main" xmlns="" id="{3686E7D2-02F0-4886-B5C9-3CFB58C2F898}"/>
+                  <a16:creationId xmlns="" xmlns:a16="http://schemas.microsoft.com/office/drawing/2014/main" id="{3686E7D2-02F0-4886-B5C9-3CFB58C2F898}"/>
                 </a:ext>
               </a:extLst>
             </p:cNvPr>
@@ -8234,7 +8234,7 @@
             <p:cNvPr id="40" name="楕円 60">
               <a:extLst>
                 <a:ext uri="{FF2B5EF4-FFF2-40B4-BE49-F238E27FC236}">
-                  <a16:creationId xmlns:a16="http://schemas.microsoft.com/office/drawing/2014/main" xmlns="" id="{420C3DCC-BA84-4A56-87FA-FBACC2B71960}"/>
+                  <a16:creationId xmlns="" xmlns:a16="http://schemas.microsoft.com/office/drawing/2014/main" id="{420C3DCC-BA84-4A56-87FA-FBACC2B71960}"/>
                 </a:ext>
               </a:extLst>
             </p:cNvPr>
@@ -8291,7 +8291,7 @@
             <p:cNvPr id="41" name="楕円 61">
               <a:extLst>
                 <a:ext uri="{FF2B5EF4-FFF2-40B4-BE49-F238E27FC236}">
-                  <a16:creationId xmlns:a16="http://schemas.microsoft.com/office/drawing/2014/main" xmlns="" id="{919B37CF-08A5-48E4-BA55-F586ED6CD2BB}"/>
+                  <a16:creationId xmlns="" xmlns:a16="http://schemas.microsoft.com/office/drawing/2014/main" id="{919B37CF-08A5-48E4-BA55-F586ED6CD2BB}"/>
                 </a:ext>
               </a:extLst>
             </p:cNvPr>
@@ -8779,7 +8779,7 @@
           <p:cNvPr id="67" name="楕円 6">
             <a:extLst>
               <a:ext uri="{FF2B5EF4-FFF2-40B4-BE49-F238E27FC236}">
-                <a16:creationId xmlns:a16="http://schemas.microsoft.com/office/drawing/2014/main" xmlns="" id="{C1EB3A8E-2720-437B-B422-11CD196A538F}"/>
+                <a16:creationId xmlns="" xmlns:a16="http://schemas.microsoft.com/office/drawing/2014/main" id="{C1EB3A8E-2720-437B-B422-11CD196A538F}"/>
               </a:ext>
             </a:extLst>
           </p:cNvPr>
@@ -8833,7 +8833,7 @@
           <p:cNvPr id="68" name="楕円 11">
             <a:extLst>
               <a:ext uri="{FF2B5EF4-FFF2-40B4-BE49-F238E27FC236}">
-                <a16:creationId xmlns:a16="http://schemas.microsoft.com/office/drawing/2014/main" xmlns="" id="{D33C16D6-EDF8-445E-9D80-E54AFD905908}"/>
+                <a16:creationId xmlns="" xmlns:a16="http://schemas.microsoft.com/office/drawing/2014/main" id="{D33C16D6-EDF8-445E-9D80-E54AFD905908}"/>
               </a:ext>
             </a:extLst>
           </p:cNvPr>
@@ -8887,7 +8887,7 @@
           <p:cNvPr id="69" name="正方形/長方形 68">
             <a:extLst>
               <a:ext uri="{FF2B5EF4-FFF2-40B4-BE49-F238E27FC236}">
-                <a16:creationId xmlns:a16="http://schemas.microsoft.com/office/drawing/2014/main" xmlns="" id="{98ECB669-E1E9-4D3D-902B-6B33A20EAE63}"/>
+                <a16:creationId xmlns="" xmlns:a16="http://schemas.microsoft.com/office/drawing/2014/main" id="{98ECB669-E1E9-4D3D-902B-6B33A20EAE63}"/>
               </a:ext>
             </a:extLst>
           </p:cNvPr>
@@ -9146,7 +9146,7 @@
             <p:cNvPr id="82" name="楕円 16">
               <a:extLst>
                 <a:ext uri="{FF2B5EF4-FFF2-40B4-BE49-F238E27FC236}">
-                  <a16:creationId xmlns:a16="http://schemas.microsoft.com/office/drawing/2014/main" xmlns="" id="{BA6516FE-57B7-42D6-B2D5-19345392BC8A}"/>
+                  <a16:creationId xmlns="" xmlns:a16="http://schemas.microsoft.com/office/drawing/2014/main" id="{BA6516FE-57B7-42D6-B2D5-19345392BC8A}"/>
                 </a:ext>
               </a:extLst>
             </p:cNvPr>
@@ -9217,7 +9217,7 @@
               <p:cNvPr id="84" name="直線コネクタ 83">
                 <a:extLst>
                   <a:ext uri="{FF2B5EF4-FFF2-40B4-BE49-F238E27FC236}">
-                    <a16:creationId xmlns:a16="http://schemas.microsoft.com/office/drawing/2014/main" xmlns="" id="{4627F8E9-976F-4ADC-9614-EA9B21AEBACD}"/>
+                    <a16:creationId xmlns="" xmlns:a16="http://schemas.microsoft.com/office/drawing/2014/main" id="{4627F8E9-976F-4ADC-9614-EA9B21AEBACD}"/>
                   </a:ext>
                 </a:extLst>
               </p:cNvPr>
@@ -9260,7 +9260,7 @@
               <p:cNvPr id="85" name="直線コネクタ 84">
                 <a:extLst>
                   <a:ext uri="{FF2B5EF4-FFF2-40B4-BE49-F238E27FC236}">
-                    <a16:creationId xmlns:a16="http://schemas.microsoft.com/office/drawing/2014/main" xmlns="" id="{96FF28A2-B3D7-4419-9F2C-1D544A351302}"/>
+                    <a16:creationId xmlns="" xmlns:a16="http://schemas.microsoft.com/office/drawing/2014/main" id="{96FF28A2-B3D7-4419-9F2C-1D544A351302}"/>
                   </a:ext>
                 </a:extLst>
               </p:cNvPr>
@@ -9303,7 +9303,7 @@
               <p:cNvPr id="86" name="直線コネクタ 85">
                 <a:extLst>
                   <a:ext uri="{FF2B5EF4-FFF2-40B4-BE49-F238E27FC236}">
-                    <a16:creationId xmlns:a16="http://schemas.microsoft.com/office/drawing/2014/main" xmlns="" id="{CFF9112A-A93F-4D9A-BD86-51365CE1D3C6}"/>
+                    <a16:creationId xmlns="" xmlns:a16="http://schemas.microsoft.com/office/drawing/2014/main" id="{CFF9112A-A93F-4D9A-BD86-51365CE1D3C6}"/>
                   </a:ext>
                 </a:extLst>
               </p:cNvPr>
@@ -9443,6 +9443,69 @@
           </a:fontRef>
         </p:style>
       </p:cxnSp>
+      <p:cxnSp>
+        <p:nvCxnSpPr>
+          <p:cNvPr id="56" name="直線矢印コネクタ 55"/>
+          <p:cNvCxnSpPr/>
+          <p:nvPr/>
+        </p:nvCxnSpPr>
+        <p:spPr>
+          <a:xfrm flipH="1">
+            <a:off x="6955869" y="1557759"/>
+            <a:ext cx="598879" cy="1110976"/>
+          </a:xfrm>
+          <a:prstGeom prst="straightConnector1">
+            <a:avLst/>
+          </a:prstGeom>
+          <a:ln w="76200">
+            <a:tailEnd type="triangle"/>
+          </a:ln>
+        </p:spPr>
+        <p:style>
+          <a:lnRef idx="1">
+            <a:schemeClr val="accent1"/>
+          </a:lnRef>
+          <a:fillRef idx="0">
+            <a:schemeClr val="accent1"/>
+          </a:fillRef>
+          <a:effectRef idx="0">
+            <a:schemeClr val="accent1"/>
+          </a:effectRef>
+          <a:fontRef idx="minor">
+            <a:schemeClr val="tx1"/>
+          </a:fontRef>
+        </p:style>
+      </p:cxnSp>
+      <p:sp>
+        <p:nvSpPr>
+          <p:cNvPr id="59" name="テキスト ボックス 58"/>
+          <p:cNvSpPr txBox="1"/>
+          <p:nvPr/>
+        </p:nvSpPr>
+        <p:spPr>
+          <a:xfrm>
+            <a:off x="7133556" y="1023819"/>
+            <a:ext cx="2262158" cy="369332"/>
+          </a:xfrm>
+          <a:prstGeom prst="rect">
+            <a:avLst/>
+          </a:prstGeom>
+          <a:noFill/>
+        </p:spPr>
+        <p:txBody>
+          <a:bodyPr wrap="none" rtlCol="0">
+            <a:spAutoFit/>
+          </a:bodyPr>
+          <a:lstStyle/>
+          <a:p>
+            <a:r>
+              <a:rPr kumimoji="1" lang="ja-JP" altLang="en-US" smtClean="0"/>
+              <a:t>壁にあたったボール</a:t>
+            </a:r>
+            <a:endParaRPr kumimoji="1" lang="en-US" altLang="ja-JP" dirty="0" smtClean="0"/>
+          </a:p>
+        </p:txBody>
+      </p:sp>
     </p:spTree>
     <p:extLst>
       <p:ext uri="{BB962C8B-B14F-4D97-AF65-F5344CB8AC3E}">

</xml_diff>

<commit_message>
add api doc for gameplay
</commit_message>
<xml_diff>
--- a/api-doc/design.pptx
+++ b/api-doc/design.pptx
@@ -5,13 +5,12 @@
     <p:sldMasterId id="2147483648" r:id="rId1"/>
   </p:sldMasterIdLst>
   <p:notesMasterIdLst>
-    <p:notesMasterId r:id="rId6"/>
+    <p:notesMasterId r:id="rId5"/>
   </p:notesMasterIdLst>
   <p:sldIdLst>
     <p:sldId id="256" r:id="rId2"/>
     <p:sldId id="257" r:id="rId3"/>
     <p:sldId id="259" r:id="rId4"/>
-    <p:sldId id="258" r:id="rId5"/>
   </p:sldIdLst>
   <p:sldSz cx="12192000" cy="6858000"/>
   <p:notesSz cx="6858000" cy="9144000"/>
@@ -7353,19 +7352,21 @@
         </p:nvSpPr>
         <p:spPr>
           <a:xfrm>
-            <a:off x="838200" y="318826"/>
-            <a:ext cx="10515600" cy="780769"/>
-          </a:xfrm>
-        </p:spPr>
-        <p:txBody>
-          <a:bodyPr/>
-          <a:lstStyle/>
-          <a:p>
-            <a:r>
-              <a:rPr kumimoji="1" lang="ja-JP" altLang="en-US" smtClean="0"/>
+            <a:off x="120045" y="134153"/>
+            <a:ext cx="5837638" cy="560426"/>
+          </a:xfrm>
+        </p:spPr>
+        <p:txBody>
+          <a:bodyPr>
+            <a:normAutofit fontScale="90000"/>
+          </a:bodyPr>
+          <a:lstStyle/>
+          <a:p>
+            <a:r>
+              <a:rPr kumimoji="1" lang="ja-JP" altLang="en-US" sz="3600" smtClean="0"/>
               <a:t>ゲーム画面通信内容</a:t>
             </a:r>
-            <a:endParaRPr kumimoji="1" lang="ja-JP" altLang="en-US"/>
+            <a:endParaRPr kumimoji="1" lang="ja-JP" altLang="en-US" sz="3600"/>
           </a:p>
         </p:txBody>
       </p:sp>
@@ -7374,7 +7375,7 @@
           <p:cNvPr id="4" name="正方形/長方形 3">
             <a:extLst>
               <a:ext uri="{FF2B5EF4-FFF2-40B4-BE49-F238E27FC236}">
-                <a16:creationId xmlns="" xmlns:a16="http://schemas.microsoft.com/office/drawing/2014/main" id="{1F01B099-C328-466C-A2FD-A26BCB38ECEE}"/>
+                <a16:creationId xmlns:a16="http://schemas.microsoft.com/office/drawing/2014/main" xmlns="" id="{1F01B099-C328-466C-A2FD-A26BCB38ECEE}"/>
               </a:ext>
             </a:extLst>
           </p:cNvPr>
@@ -7428,7 +7429,7 @@
           <p:cNvPr id="6" name="楕円 6">
             <a:extLst>
               <a:ext uri="{FF2B5EF4-FFF2-40B4-BE49-F238E27FC236}">
-                <a16:creationId xmlns="" xmlns:a16="http://schemas.microsoft.com/office/drawing/2014/main" id="{C1EB3A8E-2720-437B-B422-11CD196A538F}"/>
+                <a16:creationId xmlns:a16="http://schemas.microsoft.com/office/drawing/2014/main" xmlns="" id="{C1EB3A8E-2720-437B-B422-11CD196A538F}"/>
               </a:ext>
             </a:extLst>
           </p:cNvPr>
@@ -7482,7 +7483,7 @@
           <p:cNvPr id="8" name="楕円 11">
             <a:extLst>
               <a:ext uri="{FF2B5EF4-FFF2-40B4-BE49-F238E27FC236}">
-                <a16:creationId xmlns="" xmlns:a16="http://schemas.microsoft.com/office/drawing/2014/main" id="{D33C16D6-EDF8-445E-9D80-E54AFD905908}"/>
+                <a16:creationId xmlns:a16="http://schemas.microsoft.com/office/drawing/2014/main" xmlns="" id="{D33C16D6-EDF8-445E-9D80-E54AFD905908}"/>
               </a:ext>
             </a:extLst>
           </p:cNvPr>
@@ -7536,7 +7537,7 @@
           <p:cNvPr id="9" name="正方形/長方形 8">
             <a:extLst>
               <a:ext uri="{FF2B5EF4-FFF2-40B4-BE49-F238E27FC236}">
-                <a16:creationId xmlns="" xmlns:a16="http://schemas.microsoft.com/office/drawing/2014/main" id="{98ECB669-E1E9-4D3D-902B-6B33A20EAE63}"/>
+                <a16:creationId xmlns:a16="http://schemas.microsoft.com/office/drawing/2014/main" xmlns="" id="{98ECB669-E1E9-4D3D-902B-6B33A20EAE63}"/>
               </a:ext>
             </a:extLst>
           </p:cNvPr>
@@ -7599,7 +7600,7 @@
             <p:cNvPr id="10" name="楕円 16">
               <a:extLst>
                 <a:ext uri="{FF2B5EF4-FFF2-40B4-BE49-F238E27FC236}">
-                  <a16:creationId xmlns="" xmlns:a16="http://schemas.microsoft.com/office/drawing/2014/main" id="{BA6516FE-57B7-42D6-B2D5-19345392BC8A}"/>
+                  <a16:creationId xmlns:a16="http://schemas.microsoft.com/office/drawing/2014/main" xmlns="" id="{BA6516FE-57B7-42D6-B2D5-19345392BC8A}"/>
                 </a:ext>
               </a:extLst>
             </p:cNvPr>
@@ -7670,7 +7671,7 @@
               <p:cNvPr id="11" name="直線コネクタ 10">
                 <a:extLst>
                   <a:ext uri="{FF2B5EF4-FFF2-40B4-BE49-F238E27FC236}">
-                    <a16:creationId xmlns="" xmlns:a16="http://schemas.microsoft.com/office/drawing/2014/main" id="{4627F8E9-976F-4ADC-9614-EA9B21AEBACD}"/>
+                    <a16:creationId xmlns:a16="http://schemas.microsoft.com/office/drawing/2014/main" xmlns="" id="{4627F8E9-976F-4ADC-9614-EA9B21AEBACD}"/>
                   </a:ext>
                 </a:extLst>
               </p:cNvPr>
@@ -7713,7 +7714,7 @@
               <p:cNvPr id="12" name="直線コネクタ 11">
                 <a:extLst>
                   <a:ext uri="{FF2B5EF4-FFF2-40B4-BE49-F238E27FC236}">
-                    <a16:creationId xmlns="" xmlns:a16="http://schemas.microsoft.com/office/drawing/2014/main" id="{96FF28A2-B3D7-4419-9F2C-1D544A351302}"/>
+                    <a16:creationId xmlns:a16="http://schemas.microsoft.com/office/drawing/2014/main" xmlns="" id="{96FF28A2-B3D7-4419-9F2C-1D544A351302}"/>
                   </a:ext>
                 </a:extLst>
               </p:cNvPr>
@@ -7756,7 +7757,7 @@
               <p:cNvPr id="13" name="直線コネクタ 12">
                 <a:extLst>
                   <a:ext uri="{FF2B5EF4-FFF2-40B4-BE49-F238E27FC236}">
-                    <a16:creationId xmlns="" xmlns:a16="http://schemas.microsoft.com/office/drawing/2014/main" id="{CFF9112A-A93F-4D9A-BD86-51365CE1D3C6}"/>
+                    <a16:creationId xmlns:a16="http://schemas.microsoft.com/office/drawing/2014/main" xmlns="" id="{CFF9112A-A93F-4D9A-BD86-51365CE1D3C6}"/>
                   </a:ext>
                 </a:extLst>
               </p:cNvPr>
@@ -7815,7 +7816,7 @@
             <p:cNvPr id="18" name="楕円 47">
               <a:extLst>
                 <a:ext uri="{FF2B5EF4-FFF2-40B4-BE49-F238E27FC236}">
-                  <a16:creationId xmlns="" xmlns:a16="http://schemas.microsoft.com/office/drawing/2014/main" id="{9FA2D738-B571-41B9-B2D4-0ABE45B6D764}"/>
+                  <a16:creationId xmlns:a16="http://schemas.microsoft.com/office/drawing/2014/main" xmlns="" id="{9FA2D738-B571-41B9-B2D4-0ABE45B6D764}"/>
                 </a:ext>
               </a:extLst>
             </p:cNvPr>
@@ -7872,7 +7873,7 @@
             <p:cNvPr id="19" name="直線コネクタ 18">
               <a:extLst>
                 <a:ext uri="{FF2B5EF4-FFF2-40B4-BE49-F238E27FC236}">
-                  <a16:creationId xmlns="" xmlns:a16="http://schemas.microsoft.com/office/drawing/2014/main" id="{232E929E-676B-4082-BAB2-9FD907DA6F93}"/>
+                  <a16:creationId xmlns:a16="http://schemas.microsoft.com/office/drawing/2014/main" xmlns="" id="{232E929E-676B-4082-BAB2-9FD907DA6F93}"/>
                 </a:ext>
               </a:extLst>
             </p:cNvPr>
@@ -7915,7 +7916,7 @@
             <p:cNvPr id="20" name="直線コネクタ 19">
               <a:extLst>
                 <a:ext uri="{FF2B5EF4-FFF2-40B4-BE49-F238E27FC236}">
-                  <a16:creationId xmlns="" xmlns:a16="http://schemas.microsoft.com/office/drawing/2014/main" id="{1C445AD3-AB18-41E5-8B0E-F7CAAF01A507}"/>
+                  <a16:creationId xmlns:a16="http://schemas.microsoft.com/office/drawing/2014/main" xmlns="" id="{1C445AD3-AB18-41E5-8B0E-F7CAAF01A507}"/>
                 </a:ext>
               </a:extLst>
             </p:cNvPr>
@@ -7958,7 +7959,7 @@
             <p:cNvPr id="21" name="直線コネクタ 20">
               <a:extLst>
                 <a:ext uri="{FF2B5EF4-FFF2-40B4-BE49-F238E27FC236}">
-                  <a16:creationId xmlns="" xmlns:a16="http://schemas.microsoft.com/office/drawing/2014/main" id="{34CCF804-2773-4E1A-9C5B-0410707057C4}"/>
+                  <a16:creationId xmlns:a16="http://schemas.microsoft.com/office/drawing/2014/main" xmlns="" id="{34CCF804-2773-4E1A-9C5B-0410707057C4}"/>
                 </a:ext>
               </a:extLst>
             </p:cNvPr>
@@ -8002,7 +8003,7 @@
           <p:cNvPr id="27" name="テキスト ボックス 26">
             <a:extLst>
               <a:ext uri="{FF2B5EF4-FFF2-40B4-BE49-F238E27FC236}">
-                <a16:creationId xmlns="" xmlns:a16="http://schemas.microsoft.com/office/drawing/2014/main" id="{9D18E596-0ACF-4B77-AED2-DB44F31E81E4}"/>
+                <a16:creationId xmlns:a16="http://schemas.microsoft.com/office/drawing/2014/main" xmlns="" id="{9D18E596-0ACF-4B77-AED2-DB44F31E81E4}"/>
               </a:ext>
             </a:extLst>
           </p:cNvPr>
@@ -8011,8 +8012,8 @@
         </p:nvSpPr>
         <p:spPr>
           <a:xfrm rot="5400000">
-            <a:off x="8112896" y="5053778"/>
-            <a:ext cx="1782324" cy="307777"/>
+            <a:off x="8623497" y="3427087"/>
+            <a:ext cx="831231" cy="307777"/>
           </a:xfrm>
           <a:prstGeom prst="rect">
             <a:avLst/>
@@ -8026,12 +8027,12 @@
           <a:lstStyle/>
           <a:p>
             <a:r>
-              <a:rPr lang="ja-JP" altLang="en-US" sz="1400" dirty="0">
+              <a:rPr lang="en-US" altLang="ja-JP" sz="1400" dirty="0" smtClean="0">
                 <a:solidFill>
                   <a:schemeClr val="bg1"/>
                 </a:solidFill>
               </a:rPr>
-              <a:t>残りの夏休み日数</a:t>
+              <a:t>Player1</a:t>
             </a:r>
             <a:endParaRPr kumimoji="1" lang="ja-JP" altLang="en-US" sz="1400" dirty="0">
               <a:solidFill>
@@ -8046,7 +8047,7 @@
           <p:cNvPr id="28" name="正方形/長方形 27">
             <a:extLst>
               <a:ext uri="{FF2B5EF4-FFF2-40B4-BE49-F238E27FC236}">
-                <a16:creationId xmlns="" xmlns:a16="http://schemas.microsoft.com/office/drawing/2014/main" id="{253FC7D4-72E0-4703-84F1-0162AD7B0135}"/>
+                <a16:creationId xmlns:a16="http://schemas.microsoft.com/office/drawing/2014/main" xmlns="" id="{253FC7D4-72E0-4703-84F1-0162AD7B0135}"/>
               </a:ext>
             </a:extLst>
           </p:cNvPr>
@@ -8114,7 +8115,7 @@
             <p:cNvPr id="38" name="正方形/長方形 37">
               <a:extLst>
                 <a:ext uri="{FF2B5EF4-FFF2-40B4-BE49-F238E27FC236}">
-                  <a16:creationId xmlns="" xmlns:a16="http://schemas.microsoft.com/office/drawing/2014/main" id="{51D940FE-50CF-49CD-AC89-0B4E1B5E6049}"/>
+                  <a16:creationId xmlns:a16="http://schemas.microsoft.com/office/drawing/2014/main" xmlns="" id="{51D940FE-50CF-49CD-AC89-0B4E1B5E6049}"/>
                 </a:ext>
               </a:extLst>
             </p:cNvPr>
@@ -8174,7 +8175,7 @@
             <p:cNvPr id="39" name="正方形/長方形 38">
               <a:extLst>
                 <a:ext uri="{FF2B5EF4-FFF2-40B4-BE49-F238E27FC236}">
-                  <a16:creationId xmlns="" xmlns:a16="http://schemas.microsoft.com/office/drawing/2014/main" id="{3686E7D2-02F0-4886-B5C9-3CFB58C2F898}"/>
+                  <a16:creationId xmlns:a16="http://schemas.microsoft.com/office/drawing/2014/main" xmlns="" id="{3686E7D2-02F0-4886-B5C9-3CFB58C2F898}"/>
                 </a:ext>
               </a:extLst>
             </p:cNvPr>
@@ -8234,7 +8235,7 @@
             <p:cNvPr id="40" name="楕円 60">
               <a:extLst>
                 <a:ext uri="{FF2B5EF4-FFF2-40B4-BE49-F238E27FC236}">
-                  <a16:creationId xmlns="" xmlns:a16="http://schemas.microsoft.com/office/drawing/2014/main" id="{420C3DCC-BA84-4A56-87FA-FBACC2B71960}"/>
+                  <a16:creationId xmlns:a16="http://schemas.microsoft.com/office/drawing/2014/main" xmlns="" id="{420C3DCC-BA84-4A56-87FA-FBACC2B71960}"/>
                 </a:ext>
               </a:extLst>
             </p:cNvPr>
@@ -8291,7 +8292,7 @@
             <p:cNvPr id="41" name="楕円 61">
               <a:extLst>
                 <a:ext uri="{FF2B5EF4-FFF2-40B4-BE49-F238E27FC236}">
-                  <a16:creationId xmlns="" xmlns:a16="http://schemas.microsoft.com/office/drawing/2014/main" id="{919B37CF-08A5-48E4-BA55-F586ED6CD2BB}"/>
+                  <a16:creationId xmlns:a16="http://schemas.microsoft.com/office/drawing/2014/main" xmlns="" id="{919B37CF-08A5-48E4-BA55-F586ED6CD2BB}"/>
                 </a:ext>
               </a:extLst>
             </p:cNvPr>
@@ -8448,14 +8449,26 @@
           <a:lstStyle/>
           <a:p>
             <a:r>
-              <a:rPr lang="ja-JP" altLang="en-US" dirty="0" smtClean="0"/>
+              <a:rPr lang="ja-JP" altLang="en-US" dirty="0" smtClean="0">
+                <a:solidFill>
+                  <a:srgbClr val="C00000"/>
+                </a:solidFill>
+              </a:rPr>
               <a:t>バー移動ボタンを</a:t>
             </a:r>
             <a:r>
-              <a:rPr kumimoji="1" lang="ja-JP" altLang="en-US" dirty="0" smtClean="0"/>
+              <a:rPr kumimoji="1" lang="ja-JP" altLang="en-US" dirty="0" smtClean="0">
+                <a:solidFill>
+                  <a:srgbClr val="C00000"/>
+                </a:solidFill>
+              </a:rPr>
               <a:t>押したタイミング</a:t>
             </a:r>
-            <a:endParaRPr kumimoji="1" lang="ja-JP" altLang="en-US" dirty="0"/>
+            <a:endParaRPr kumimoji="1" lang="ja-JP" altLang="en-US" dirty="0">
+              <a:solidFill>
+                <a:srgbClr val="C00000"/>
+              </a:solidFill>
+            </a:endParaRPr>
           </a:p>
         </p:txBody>
       </p:sp>
@@ -8515,24 +8528,56 @@
           <a:lstStyle/>
           <a:p>
             <a:r>
-              <a:rPr kumimoji="1" lang="ja-JP" altLang="en-US" dirty="0" smtClean="0"/>
-              <a:t>射出したボール</a:t>
-            </a:r>
-            <a:endParaRPr kumimoji="1" lang="en-US" altLang="ja-JP" dirty="0" smtClean="0"/>
-          </a:p>
-          <a:p>
-            <a:r>
-              <a:rPr kumimoji="1" lang="ja-JP" altLang="en-US" dirty="0" smtClean="0"/>
+              <a:rPr kumimoji="1" lang="ja-JP" altLang="en-US" smtClean="0">
+                <a:solidFill>
+                  <a:schemeClr val="accent6"/>
+                </a:solidFill>
+              </a:rPr>
+              <a:t>射出した</a:t>
+            </a:r>
+            <a:r>
+              <a:rPr kumimoji="1" lang="ja-JP" altLang="en-US" smtClean="0">
+                <a:solidFill>
+                  <a:schemeClr val="accent6"/>
+                </a:solidFill>
+              </a:rPr>
+              <a:t>ボール</a:t>
+            </a:r>
+            <a:endParaRPr kumimoji="1" lang="en-US" altLang="ja-JP" dirty="0" smtClean="0">
+              <a:solidFill>
+                <a:schemeClr val="accent6"/>
+              </a:solidFill>
+            </a:endParaRPr>
+          </a:p>
+          <a:p>
+            <a:r>
+              <a:rPr kumimoji="1" lang="ja-JP" altLang="en-US" dirty="0" smtClean="0">
+                <a:solidFill>
+                  <a:schemeClr val="accent6"/>
+                </a:solidFill>
+              </a:rPr>
               <a:t>・ベクトル</a:t>
             </a:r>
-            <a:endParaRPr kumimoji="1" lang="en-US" altLang="ja-JP" dirty="0" smtClean="0"/>
-          </a:p>
-          <a:p>
-            <a:r>
-              <a:rPr lang="ja-JP" altLang="en-US" dirty="0" smtClean="0"/>
+            <a:endParaRPr kumimoji="1" lang="en-US" altLang="ja-JP" dirty="0" smtClean="0">
+              <a:solidFill>
+                <a:schemeClr val="accent6"/>
+              </a:solidFill>
+            </a:endParaRPr>
+          </a:p>
+          <a:p>
+            <a:r>
+              <a:rPr lang="ja-JP" altLang="en-US" dirty="0" smtClean="0">
+                <a:solidFill>
+                  <a:schemeClr val="accent6"/>
+                </a:solidFill>
+              </a:rPr>
               <a:t>・種類</a:t>
             </a:r>
-            <a:endParaRPr kumimoji="1" lang="ja-JP" altLang="en-US" dirty="0"/>
+            <a:endParaRPr kumimoji="1" lang="ja-JP" altLang="en-US" dirty="0">
+              <a:solidFill>
+                <a:schemeClr val="accent6"/>
+              </a:solidFill>
+            </a:endParaRPr>
           </a:p>
         </p:txBody>
       </p:sp>
@@ -8592,46 +8637,21 @@
           <a:lstStyle/>
           <a:p>
             <a:r>
-              <a:rPr kumimoji="1" lang="ja-JP" altLang="en-US" dirty="0" smtClean="0"/>
+              <a:rPr kumimoji="1" lang="ja-JP" altLang="en-US" dirty="0" smtClean="0">
+                <a:solidFill>
+                  <a:srgbClr val="C00000"/>
+                </a:solidFill>
+              </a:rPr>
               <a:t>ゴールへ入ったボール</a:t>
             </a:r>
-            <a:endParaRPr kumimoji="1" lang="en-US" altLang="ja-JP" dirty="0" smtClean="0"/>
-          </a:p>
-        </p:txBody>
-      </p:sp>
-      <p:cxnSp>
-        <p:nvCxnSpPr>
-          <p:cNvPr id="58" name="直線矢印コネクタ 57"/>
-          <p:cNvCxnSpPr/>
-          <p:nvPr/>
-        </p:nvCxnSpPr>
-        <p:spPr>
-          <a:xfrm flipH="1">
-            <a:off x="8689501" y="2801768"/>
-            <a:ext cx="894214" cy="794518"/>
-          </a:xfrm>
-          <a:prstGeom prst="straightConnector1">
-            <a:avLst/>
-          </a:prstGeom>
-          <a:ln w="76200">
-            <a:tailEnd type="triangle"/>
-          </a:ln>
-        </p:spPr>
-        <p:style>
-          <a:lnRef idx="1">
-            <a:schemeClr val="accent1"/>
-          </a:lnRef>
-          <a:fillRef idx="0">
-            <a:schemeClr val="accent1"/>
-          </a:fillRef>
-          <a:effectRef idx="0">
-            <a:schemeClr val="accent1"/>
-          </a:effectRef>
-          <a:fontRef idx="minor">
-            <a:schemeClr val="tx1"/>
-          </a:fontRef>
-        </p:style>
-      </p:cxnSp>
+            <a:endParaRPr kumimoji="1" lang="en-US" altLang="ja-JP" dirty="0" smtClean="0">
+              <a:solidFill>
+                <a:srgbClr val="C00000"/>
+              </a:solidFill>
+            </a:endParaRPr>
+          </a:p>
+        </p:txBody>
+      </p:sp>
       <p:sp>
         <p:nvSpPr>
           <p:cNvPr id="60" name="テキスト ボックス 59"/>
@@ -8701,10 +8721,18 @@
           <a:lstStyle/>
           <a:p>
             <a:r>
-              <a:rPr kumimoji="1" lang="ja-JP" altLang="en-US" dirty="0" smtClean="0"/>
+              <a:rPr kumimoji="1" lang="ja-JP" altLang="en-US" dirty="0" smtClean="0">
+                <a:solidFill>
+                  <a:schemeClr val="accent6"/>
+                </a:solidFill>
+              </a:rPr>
               <a:t>残り時間</a:t>
             </a:r>
-            <a:endParaRPr kumimoji="1" lang="en-US" altLang="ja-JP" dirty="0" smtClean="0"/>
+            <a:endParaRPr kumimoji="1" lang="en-US" altLang="ja-JP" dirty="0" smtClean="0">
+              <a:solidFill>
+                <a:schemeClr val="accent6"/>
+              </a:solidFill>
+            </a:endParaRPr>
           </a:p>
         </p:txBody>
       </p:sp>
@@ -8749,8 +8777,8 @@
         </p:nvCxnSpPr>
         <p:spPr>
           <a:xfrm flipH="1">
-            <a:off x="9221258" y="4922612"/>
-            <a:ext cx="804130" cy="382374"/>
+            <a:off x="8938346" y="4058132"/>
+            <a:ext cx="837827" cy="296101"/>
           </a:xfrm>
           <a:prstGeom prst="straightConnector1">
             <a:avLst/>
@@ -8779,7 +8807,7 @@
           <p:cNvPr id="67" name="楕円 6">
             <a:extLst>
               <a:ext uri="{FF2B5EF4-FFF2-40B4-BE49-F238E27FC236}">
-                <a16:creationId xmlns="" xmlns:a16="http://schemas.microsoft.com/office/drawing/2014/main" id="{C1EB3A8E-2720-437B-B422-11CD196A538F}"/>
+                <a16:creationId xmlns:a16="http://schemas.microsoft.com/office/drawing/2014/main" xmlns="" id="{C1EB3A8E-2720-437B-B422-11CD196A538F}"/>
               </a:ext>
             </a:extLst>
           </p:cNvPr>
@@ -8833,7 +8861,7 @@
           <p:cNvPr id="68" name="楕円 11">
             <a:extLst>
               <a:ext uri="{FF2B5EF4-FFF2-40B4-BE49-F238E27FC236}">
-                <a16:creationId xmlns="" xmlns:a16="http://schemas.microsoft.com/office/drawing/2014/main" id="{D33C16D6-EDF8-445E-9D80-E54AFD905908}"/>
+                <a16:creationId xmlns:a16="http://schemas.microsoft.com/office/drawing/2014/main" xmlns="" id="{D33C16D6-EDF8-445E-9D80-E54AFD905908}"/>
               </a:ext>
             </a:extLst>
           </p:cNvPr>
@@ -8887,7 +8915,7 @@
           <p:cNvPr id="69" name="正方形/長方形 68">
             <a:extLst>
               <a:ext uri="{FF2B5EF4-FFF2-40B4-BE49-F238E27FC236}">
-                <a16:creationId xmlns="" xmlns:a16="http://schemas.microsoft.com/office/drawing/2014/main" id="{98ECB669-E1E9-4D3D-902B-6B33A20EAE63}"/>
+                <a16:creationId xmlns:a16="http://schemas.microsoft.com/office/drawing/2014/main" xmlns="" id="{98ECB669-E1E9-4D3D-902B-6B33A20EAE63}"/>
               </a:ext>
             </a:extLst>
           </p:cNvPr>
@@ -9009,8 +9037,8 @@
         </p:nvSpPr>
         <p:spPr>
           <a:xfrm>
-            <a:off x="9398344" y="4447054"/>
-            <a:ext cx="2031325" cy="369332"/>
+            <a:off x="9827335" y="3767396"/>
+            <a:ext cx="877163" cy="369332"/>
           </a:xfrm>
           <a:prstGeom prst="rect">
             <a:avLst/>
@@ -9024,10 +9052,18 @@
           <a:lstStyle/>
           <a:p>
             <a:r>
-              <a:rPr kumimoji="1" lang="ja-JP" altLang="en-US" dirty="0" smtClean="0"/>
-              <a:t>残りの夏休み日数</a:t>
-            </a:r>
-            <a:endParaRPr kumimoji="1" lang="en-US" altLang="ja-JP" dirty="0" smtClean="0"/>
+              <a:rPr kumimoji="1" lang="ja-JP" altLang="en-US" dirty="0" smtClean="0">
+                <a:solidFill>
+                  <a:schemeClr val="accent6"/>
+                </a:solidFill>
+              </a:rPr>
+              <a:t>スコア</a:t>
+            </a:r>
+            <a:endParaRPr kumimoji="1" lang="en-US" altLang="ja-JP" dirty="0" smtClean="0">
+              <a:solidFill>
+                <a:schemeClr val="accent6"/>
+              </a:solidFill>
+            </a:endParaRPr>
           </a:p>
         </p:txBody>
       </p:sp>
@@ -9087,10 +9123,18 @@
           <a:lstStyle/>
           <a:p>
             <a:r>
-              <a:rPr kumimoji="1" lang="ja-JP" altLang="en-US" smtClean="0"/>
+              <a:rPr kumimoji="1" lang="ja-JP" altLang="en-US" smtClean="0">
+                <a:solidFill>
+                  <a:srgbClr val="C00000"/>
+                </a:solidFill>
+              </a:rPr>
               <a:t>バーの位置</a:t>
             </a:r>
-            <a:endParaRPr kumimoji="1" lang="en-US" altLang="ja-JP" dirty="0" smtClean="0"/>
+            <a:endParaRPr kumimoji="1" lang="en-US" altLang="ja-JP" dirty="0" smtClean="0">
+              <a:solidFill>
+                <a:srgbClr val="C00000"/>
+              </a:solidFill>
+            </a:endParaRPr>
           </a:p>
         </p:txBody>
       </p:sp>
@@ -9146,7 +9190,7 @@
             <p:cNvPr id="82" name="楕円 16">
               <a:extLst>
                 <a:ext uri="{FF2B5EF4-FFF2-40B4-BE49-F238E27FC236}">
-                  <a16:creationId xmlns="" xmlns:a16="http://schemas.microsoft.com/office/drawing/2014/main" id="{BA6516FE-57B7-42D6-B2D5-19345392BC8A}"/>
+                  <a16:creationId xmlns:a16="http://schemas.microsoft.com/office/drawing/2014/main" xmlns="" id="{BA6516FE-57B7-42D6-B2D5-19345392BC8A}"/>
                 </a:ext>
               </a:extLst>
             </p:cNvPr>
@@ -9217,7 +9261,7 @@
               <p:cNvPr id="84" name="直線コネクタ 83">
                 <a:extLst>
                   <a:ext uri="{FF2B5EF4-FFF2-40B4-BE49-F238E27FC236}">
-                    <a16:creationId xmlns="" xmlns:a16="http://schemas.microsoft.com/office/drawing/2014/main" id="{4627F8E9-976F-4ADC-9614-EA9B21AEBACD}"/>
+                    <a16:creationId xmlns:a16="http://schemas.microsoft.com/office/drawing/2014/main" xmlns="" id="{4627F8E9-976F-4ADC-9614-EA9B21AEBACD}"/>
                   </a:ext>
                 </a:extLst>
               </p:cNvPr>
@@ -9260,7 +9304,7 @@
               <p:cNvPr id="85" name="直線コネクタ 84">
                 <a:extLst>
                   <a:ext uri="{FF2B5EF4-FFF2-40B4-BE49-F238E27FC236}">
-                    <a16:creationId xmlns="" xmlns:a16="http://schemas.microsoft.com/office/drawing/2014/main" id="{96FF28A2-B3D7-4419-9F2C-1D544A351302}"/>
+                    <a16:creationId xmlns:a16="http://schemas.microsoft.com/office/drawing/2014/main" xmlns="" id="{96FF28A2-B3D7-4419-9F2C-1D544A351302}"/>
                   </a:ext>
                 </a:extLst>
               </p:cNvPr>
@@ -9303,7 +9347,7 @@
               <p:cNvPr id="86" name="直線コネクタ 85">
                 <a:extLst>
                   <a:ext uri="{FF2B5EF4-FFF2-40B4-BE49-F238E27FC236}">
-                    <a16:creationId xmlns="" xmlns:a16="http://schemas.microsoft.com/office/drawing/2014/main" id="{CFF9112A-A93F-4D9A-BD86-51365CE1D3C6}"/>
+                    <a16:creationId xmlns:a16="http://schemas.microsoft.com/office/drawing/2014/main" xmlns="" id="{CFF9112A-A93F-4D9A-BD86-51365CE1D3C6}"/>
                   </a:ext>
                 </a:extLst>
               </p:cNvPr>
@@ -9351,8 +9395,8 @@
         </p:nvSpPr>
         <p:spPr>
           <a:xfrm>
-            <a:off x="2205589" y="6380720"/>
-            <a:ext cx="3647152" cy="369332"/>
+            <a:off x="1147049" y="6329718"/>
+            <a:ext cx="4750018" cy="369332"/>
           </a:xfrm>
           <a:prstGeom prst="rect">
             <a:avLst/>
@@ -9366,10 +9410,50 @@
           <a:lstStyle/>
           <a:p>
             <a:r>
-              <a:rPr kumimoji="1" lang="ja-JP" altLang="en-US" smtClean="0"/>
-              <a:t>ボールを反射した位置、ベクトル</a:t>
-            </a:r>
-            <a:endParaRPr kumimoji="1" lang="en-US" altLang="ja-JP" dirty="0" smtClean="0"/>
+              <a:rPr kumimoji="1" lang="ja-JP" altLang="en-US" dirty="0" smtClean="0">
+                <a:solidFill>
+                  <a:srgbClr val="C00000"/>
+                </a:solidFill>
+              </a:rPr>
+              <a:t>ボールを反射した位置、</a:t>
+            </a:r>
+            <a:r>
+              <a:rPr kumimoji="1" lang="ja-JP" altLang="en-US" dirty="0" smtClean="0">
+                <a:solidFill>
+                  <a:srgbClr val="C00000"/>
+                </a:solidFill>
+              </a:rPr>
+              <a:t>ベクトル</a:t>
+            </a:r>
+            <a:r>
+              <a:rPr kumimoji="1" lang="en-US" altLang="ja-JP" dirty="0" smtClean="0">
+                <a:solidFill>
+                  <a:srgbClr val="C00000"/>
+                </a:solidFill>
+              </a:rPr>
+              <a:t>(</a:t>
+            </a:r>
+            <a:r>
+              <a:rPr kumimoji="1" lang="ja-JP" altLang="en-US" dirty="0" smtClean="0">
+                <a:solidFill>
+                  <a:srgbClr val="C00000"/>
+                </a:solidFill>
+              </a:rPr>
+              <a:t>壁を含む</a:t>
+            </a:r>
+            <a:r>
+              <a:rPr kumimoji="1" lang="en-US" altLang="ja-JP" dirty="0" smtClean="0">
+                <a:solidFill>
+                  <a:srgbClr val="C00000"/>
+                </a:solidFill>
+              </a:rPr>
+              <a:t>)</a:t>
+            </a:r>
+            <a:endParaRPr kumimoji="1" lang="en-US" altLang="ja-JP" dirty="0" smtClean="0">
+              <a:solidFill>
+                <a:srgbClr val="C00000"/>
+              </a:solidFill>
+            </a:endParaRPr>
           </a:p>
         </p:txBody>
       </p:sp>
@@ -9396,17 +9480,33 @@
           <a:lstStyle/>
           <a:p>
             <a:r>
-              <a:rPr kumimoji="1" lang="ja-JP" altLang="en-US" dirty="0" smtClean="0"/>
+              <a:rPr kumimoji="1" lang="ja-JP" altLang="en-US" dirty="0" smtClean="0">
+                <a:solidFill>
+                  <a:srgbClr val="C00000"/>
+                </a:solidFill>
+              </a:rPr>
               <a:t>スペシャルボールの</a:t>
             </a:r>
-            <a:endParaRPr kumimoji="1" lang="en-US" altLang="ja-JP" dirty="0" smtClean="0"/>
-          </a:p>
-          <a:p>
-            <a:r>
-              <a:rPr lang="ja-JP" altLang="en-US" dirty="0" smtClean="0"/>
+            <a:endParaRPr kumimoji="1" lang="en-US" altLang="ja-JP" dirty="0" smtClean="0">
+              <a:solidFill>
+                <a:srgbClr val="C00000"/>
+              </a:solidFill>
+            </a:endParaRPr>
+          </a:p>
+          <a:p>
+            <a:r>
+              <a:rPr lang="ja-JP" altLang="en-US" dirty="0" smtClean="0">
+                <a:solidFill>
+                  <a:srgbClr val="C00000"/>
+                </a:solidFill>
+              </a:rPr>
               <a:t>タイミング</a:t>
             </a:r>
-            <a:endParaRPr kumimoji="1" lang="ja-JP" altLang="en-US" dirty="0"/>
+            <a:endParaRPr kumimoji="1" lang="ja-JP" altLang="en-US" dirty="0">
+              <a:solidFill>
+                <a:srgbClr val="C00000"/>
+              </a:solidFill>
+            </a:endParaRPr>
           </a:p>
         </p:txBody>
       </p:sp>
@@ -9443,49 +9543,16 @@
           </a:fontRef>
         </p:style>
       </p:cxnSp>
-      <p:cxnSp>
-        <p:nvCxnSpPr>
-          <p:cNvPr id="56" name="直線矢印コネクタ 55"/>
-          <p:cNvCxnSpPr/>
-          <p:nvPr/>
-        </p:nvCxnSpPr>
-        <p:spPr>
-          <a:xfrm flipH="1">
-            <a:off x="6955869" y="1557759"/>
-            <a:ext cx="598879" cy="1110976"/>
-          </a:xfrm>
-          <a:prstGeom prst="straightConnector1">
-            <a:avLst/>
-          </a:prstGeom>
-          <a:ln w="76200">
-            <a:tailEnd type="triangle"/>
-          </a:ln>
-        </p:spPr>
-        <p:style>
-          <a:lnRef idx="1">
-            <a:schemeClr val="accent1"/>
-          </a:lnRef>
-          <a:fillRef idx="0">
-            <a:schemeClr val="accent1"/>
-          </a:fillRef>
-          <a:effectRef idx="0">
-            <a:schemeClr val="accent1"/>
-          </a:effectRef>
-          <a:fontRef idx="minor">
-            <a:schemeClr val="tx1"/>
-          </a:fontRef>
-        </p:style>
-      </p:cxnSp>
-      <p:sp>
-        <p:nvSpPr>
-          <p:cNvPr id="59" name="テキスト ボックス 58"/>
+      <p:sp>
+        <p:nvSpPr>
+          <p:cNvPr id="63" name="テキスト ボックス 62"/>
           <p:cNvSpPr txBox="1"/>
           <p:nvPr/>
         </p:nvSpPr>
         <p:spPr>
           <a:xfrm>
-            <a:off x="7133556" y="1023819"/>
-            <a:ext cx="2262158" cy="369332"/>
+            <a:off x="4393305" y="121093"/>
+            <a:ext cx="3161443" cy="369332"/>
           </a:xfrm>
           <a:prstGeom prst="rect">
             <a:avLst/>
@@ -9499,65 +9566,118 @@
           <a:lstStyle/>
           <a:p>
             <a:r>
-              <a:rPr kumimoji="1" lang="ja-JP" altLang="en-US" smtClean="0"/>
-              <a:t>壁にあたったボール</a:t>
-            </a:r>
-            <a:endParaRPr kumimoji="1" lang="en-US" altLang="ja-JP" dirty="0" smtClean="0"/>
-          </a:p>
-        </p:txBody>
-      </p:sp>
-    </p:spTree>
-    <p:extLst>
-      <p:ext uri="{BB962C8B-B14F-4D97-AF65-F5344CB8AC3E}">
-        <p14:creationId xmlns:p14="http://schemas.microsoft.com/office/powerpoint/2010/main" val="289858649"/>
-      </p:ext>
-    </p:extLst>
-  </p:cSld>
-  <p:clrMapOvr>
-    <a:masterClrMapping/>
-  </p:clrMapOvr>
-</p:sld>
-</file>
-
-<file path=ppt/slides/slide4.xml><?xml version="1.0" encoding="utf-8"?>
-<p:sld xmlns:a="http://schemas.openxmlformats.org/drawingml/2006/main" xmlns:r="http://schemas.openxmlformats.org/officeDocument/2006/relationships" xmlns:p="http://schemas.openxmlformats.org/presentationml/2006/main">
-  <p:cSld>
-    <p:spTree>
-      <p:nvGrpSpPr>
-        <p:cNvPr id="1" name=""/>
-        <p:cNvGrpSpPr/>
-        <p:nvPr/>
-      </p:nvGrpSpPr>
-      <p:grpSpPr>
-        <a:xfrm>
-          <a:off x="0" y="0"/>
-          <a:ext cx="0" cy="0"/>
-          <a:chOff x="0" y="0"/>
-          <a:chExt cx="0" cy="0"/>
-        </a:xfrm>
-      </p:grpSpPr>
-      <p:sp>
-        <p:nvSpPr>
-          <p:cNvPr id="7" name="正方形/長方形 6"/>
+              <a:rPr lang="ja-JP" altLang="en-US" dirty="0" smtClean="0">
+                <a:solidFill>
+                  <a:schemeClr val="accent6"/>
+                </a:solidFill>
+              </a:rPr>
+              <a:t>緑色の通信</a:t>
+            </a:r>
+            <a:r>
+              <a:rPr lang="en-US" altLang="ja-JP" dirty="0" smtClean="0">
+                <a:solidFill>
+                  <a:schemeClr val="accent6"/>
+                </a:solidFill>
+              </a:rPr>
+              <a:t> = Node -&gt; Unity</a:t>
+            </a:r>
+            <a:endParaRPr kumimoji="1" lang="ja-JP" altLang="en-US" dirty="0">
+              <a:solidFill>
+                <a:schemeClr val="accent6"/>
+              </a:solidFill>
+            </a:endParaRPr>
+          </a:p>
+        </p:txBody>
+      </p:sp>
+      <p:sp>
+        <p:nvSpPr>
+          <p:cNvPr id="66" name="テキスト ボックス 65"/>
+          <p:cNvSpPr txBox="1"/>
+          <p:nvPr/>
+        </p:nvSpPr>
+        <p:spPr>
+          <a:xfrm>
+            <a:off x="4376961" y="579257"/>
+            <a:ext cx="6213560" cy="369332"/>
+          </a:xfrm>
+          <a:prstGeom prst="rect">
+            <a:avLst/>
+          </a:prstGeom>
+          <a:noFill/>
+        </p:spPr>
+        <p:txBody>
+          <a:bodyPr wrap="none" rtlCol="0">
+            <a:spAutoFit/>
+          </a:bodyPr>
+          <a:lstStyle/>
+          <a:p>
+            <a:r>
+              <a:rPr lang="ja-JP" altLang="en-US" dirty="0" smtClean="0">
+                <a:solidFill>
+                  <a:srgbClr val="C00000"/>
+                </a:solidFill>
+              </a:rPr>
+              <a:t>赤色の通信</a:t>
+            </a:r>
+            <a:r>
+              <a:rPr lang="en-US" altLang="ja-JP" dirty="0" smtClean="0">
+                <a:solidFill>
+                  <a:srgbClr val="C00000"/>
+                </a:solidFill>
+              </a:rPr>
+              <a:t> = Unity -&gt; Node -&gt; Unity (</a:t>
+            </a:r>
+            <a:r>
+              <a:rPr lang="ja-JP" altLang="en-US" dirty="0" smtClean="0">
+                <a:solidFill>
+                  <a:srgbClr val="C00000"/>
+                </a:solidFill>
+              </a:rPr>
+              <a:t>ブロードキャスト</a:t>
+            </a:r>
+            <a:r>
+              <a:rPr lang="en-US" altLang="ja-JP" dirty="0" smtClean="0">
+                <a:solidFill>
+                  <a:srgbClr val="C00000"/>
+                </a:solidFill>
+              </a:rPr>
+              <a:t>)</a:t>
+            </a:r>
+            <a:endParaRPr kumimoji="1" lang="ja-JP" altLang="en-US" dirty="0">
+              <a:solidFill>
+                <a:srgbClr val="C00000"/>
+              </a:solidFill>
+            </a:endParaRPr>
+          </a:p>
+        </p:txBody>
+      </p:sp>
+      <p:sp>
+        <p:nvSpPr>
+          <p:cNvPr id="70" name="正方形/長方形 69">
+            <a:extLst>
+              <a:ext uri="{FF2B5EF4-FFF2-40B4-BE49-F238E27FC236}">
+                <a16:creationId xmlns:a16="http://schemas.microsoft.com/office/drawing/2014/main" xmlns="" id="{253FC7D4-72E0-4703-84F1-0162AD7B0135}"/>
+              </a:ext>
+            </a:extLst>
+          </p:cNvPr>
           <p:cNvSpPr/>
           <p:nvPr/>
         </p:nvSpPr>
         <p:spPr>
           <a:xfrm>
-            <a:off x="141515" y="770440"/>
-            <a:ext cx="4158636" cy="5951636"/>
+            <a:off x="8695670" y="2791929"/>
+            <a:ext cx="106954" cy="1578095"/>
           </a:xfrm>
           <a:prstGeom prst="rect">
             <a:avLst/>
           </a:prstGeom>
-          <a:noFill/>
-          <a:ln>
+          <a:solidFill>
+            <a:schemeClr val="accent6"/>
+          </a:solidFill>
+          <a:ln w="28575">
             <a:solidFill>
-              <a:schemeClr val="bg1">
-                <a:lumMod val="75000"/>
-              </a:schemeClr>
+              <a:schemeClr val="bg1"/>
             </a:solidFill>
-            <a:prstDash val="dash"/>
           </a:ln>
         </p:spPr>
         <p:style>
@@ -9587,133 +9707,20 @@
       </p:sp>
       <p:sp>
         <p:nvSpPr>
-          <p:cNvPr id="2" name="タイトル 1"/>
-          <p:cNvSpPr>
-            <a:spLocks noGrp="1"/>
-          </p:cNvSpPr>
-          <p:nvPr>
-            <p:ph type="title"/>
-          </p:nvPr>
-        </p:nvSpPr>
-        <p:spPr>
-          <a:xfrm>
-            <a:off x="141515" y="35503"/>
-            <a:ext cx="10515600" cy="301326"/>
-          </a:xfrm>
-        </p:spPr>
-        <p:txBody>
-          <a:bodyPr>
-            <a:normAutofit fontScale="90000"/>
-          </a:bodyPr>
-          <a:lstStyle/>
-          <a:p>
-            <a:r>
-              <a:rPr lang="ja-JP" altLang="en-US" sz="1800" dirty="0" smtClean="0"/>
-              <a:t>通常機能通信シーケンス</a:t>
-            </a:r>
-            <a:endParaRPr kumimoji="1" lang="ja-JP" altLang="en-US" sz="1800" dirty="0"/>
-          </a:p>
-        </p:txBody>
-      </p:sp>
-      <p:sp>
-        <p:nvSpPr>
-          <p:cNvPr id="27" name="正方形/長方形 26"/>
-          <p:cNvSpPr/>
-          <p:nvPr/>
-        </p:nvSpPr>
-        <p:spPr>
-          <a:xfrm>
-            <a:off x="9273668" y="9095621"/>
-            <a:ext cx="2766894" cy="2844687"/>
-          </a:xfrm>
-          <a:prstGeom prst="rect">
-            <a:avLst/>
-          </a:prstGeom>
-          <a:noFill/>
-          <a:ln>
-            <a:solidFill>
-              <a:schemeClr val="bg1">
-                <a:lumMod val="65000"/>
-              </a:schemeClr>
-            </a:solidFill>
-            <a:prstDash val="dash"/>
-          </a:ln>
-        </p:spPr>
-        <p:style>
-          <a:lnRef idx="2">
-            <a:schemeClr val="accent1">
-              <a:shade val="50000"/>
-            </a:schemeClr>
-          </a:lnRef>
-          <a:fillRef idx="1">
-            <a:schemeClr val="accent1"/>
-          </a:fillRef>
-          <a:effectRef idx="0">
-            <a:schemeClr val="accent1"/>
-          </a:effectRef>
-          <a:fontRef idx="minor">
-            <a:schemeClr val="lt1"/>
-          </a:fontRef>
-        </p:style>
-        <p:txBody>
-          <a:bodyPr rtlCol="0" anchor="ctr"/>
-          <a:lstStyle/>
-          <a:p>
-            <a:pPr algn="ctr"/>
-            <a:endParaRPr kumimoji="1" lang="ja-JP" altLang="en-US"/>
-          </a:p>
-        </p:txBody>
-      </p:sp>
-      <p:sp>
-        <p:nvSpPr>
-          <p:cNvPr id="28" name="角丸四角形 27"/>
-          <p:cNvSpPr/>
-          <p:nvPr/>
-        </p:nvSpPr>
-        <p:spPr>
-          <a:xfrm>
-            <a:off x="10208481" y="10099033"/>
-            <a:ext cx="1294105" cy="674913"/>
-          </a:xfrm>
-          <a:prstGeom prst="roundRect">
-            <a:avLst/>
-          </a:prstGeom>
-        </p:spPr>
-        <p:style>
-          <a:lnRef idx="2">
-            <a:schemeClr val="accent1">
-              <a:shade val="50000"/>
-            </a:schemeClr>
-          </a:lnRef>
-          <a:fillRef idx="1">
-            <a:schemeClr val="accent1"/>
-          </a:fillRef>
-          <a:effectRef idx="0">
-            <a:schemeClr val="accent1"/>
-          </a:effectRef>
-          <a:fontRef idx="minor">
-            <a:schemeClr val="lt1"/>
-          </a:fontRef>
-        </p:style>
-        <p:txBody>
-          <a:bodyPr rtlCol="0" anchor="ctr"/>
-          <a:lstStyle/>
-          <a:p>
-            <a:pPr algn="ctr"/>
-            <a:endParaRPr kumimoji="1" lang="ja-JP" altLang="en-US"/>
-          </a:p>
-        </p:txBody>
-      </p:sp>
-      <p:sp>
-        <p:nvSpPr>
-          <p:cNvPr id="29" name="テキスト ボックス 28"/>
+          <p:cNvPr id="73" name="テキスト ボックス 72">
+            <a:extLst>
+              <a:ext uri="{FF2B5EF4-FFF2-40B4-BE49-F238E27FC236}">
+                <a16:creationId xmlns:a16="http://schemas.microsoft.com/office/drawing/2014/main" xmlns="" id="{9D18E596-0ACF-4B77-AED2-DB44F31E81E4}"/>
+              </a:ext>
+            </a:extLst>
+          </p:cNvPr>
           <p:cNvSpPr txBox="1"/>
           <p:nvPr/>
         </p:nvSpPr>
         <p:spPr>
-          <a:xfrm>
-            <a:off x="9273667" y="9095621"/>
-            <a:ext cx="1301299" cy="307777"/>
+          <a:xfrm rot="5400000">
+            <a:off x="8622672" y="4957344"/>
+            <a:ext cx="831231" cy="307777"/>
           </a:xfrm>
           <a:prstGeom prst="rect">
             <a:avLst/>
@@ -9727,584 +9734,37 @@
           <a:lstStyle/>
           <a:p>
             <a:r>
-              <a:rPr lang="ja-JP" altLang="en-US" sz="1400" dirty="0" smtClean="0"/>
-              <a:t>リザルト画面</a:t>
-            </a:r>
-            <a:endParaRPr kumimoji="1" lang="ja-JP" altLang="en-US" sz="1400" dirty="0"/>
-          </a:p>
-        </p:txBody>
-      </p:sp>
-      <p:sp>
-        <p:nvSpPr>
-          <p:cNvPr id="33" name="正方形/長方形 32"/>
-          <p:cNvSpPr/>
-          <p:nvPr/>
-        </p:nvSpPr>
-        <p:spPr>
-          <a:xfrm>
-            <a:off x="6207662" y="9095621"/>
-            <a:ext cx="2766894" cy="2844687"/>
-          </a:xfrm>
-          <a:prstGeom prst="rect">
-            <a:avLst/>
-          </a:prstGeom>
-          <a:noFill/>
-          <a:ln>
-            <a:solidFill>
-              <a:schemeClr val="bg1">
-                <a:lumMod val="65000"/>
-              </a:schemeClr>
-            </a:solidFill>
-            <a:prstDash val="dash"/>
-          </a:ln>
-        </p:spPr>
-        <p:style>
-          <a:lnRef idx="2">
-            <a:schemeClr val="accent1">
-              <a:shade val="50000"/>
-            </a:schemeClr>
-          </a:lnRef>
-          <a:fillRef idx="1">
-            <a:schemeClr val="accent1"/>
-          </a:fillRef>
-          <a:effectRef idx="0">
-            <a:schemeClr val="accent1"/>
-          </a:effectRef>
-          <a:fontRef idx="minor">
-            <a:schemeClr val="lt1"/>
-          </a:fontRef>
-        </p:style>
-        <p:txBody>
-          <a:bodyPr rtlCol="0" anchor="ctr"/>
-          <a:lstStyle/>
-          <a:p>
-            <a:pPr algn="ctr"/>
-            <a:endParaRPr kumimoji="1" lang="ja-JP" altLang="en-US"/>
-          </a:p>
-        </p:txBody>
-      </p:sp>
-      <p:sp>
-        <p:nvSpPr>
-          <p:cNvPr id="34" name="角丸四角形 33"/>
-          <p:cNvSpPr/>
-          <p:nvPr/>
-        </p:nvSpPr>
-        <p:spPr>
-          <a:xfrm>
-            <a:off x="7142475" y="10099033"/>
-            <a:ext cx="1294105" cy="674913"/>
-          </a:xfrm>
-          <a:prstGeom prst="roundRect">
-            <a:avLst/>
-          </a:prstGeom>
-        </p:spPr>
-        <p:style>
-          <a:lnRef idx="2">
-            <a:schemeClr val="accent1">
-              <a:shade val="50000"/>
-            </a:schemeClr>
-          </a:lnRef>
-          <a:fillRef idx="1">
-            <a:schemeClr val="accent1"/>
-          </a:fillRef>
-          <a:effectRef idx="0">
-            <a:schemeClr val="accent1"/>
-          </a:effectRef>
-          <a:fontRef idx="minor">
-            <a:schemeClr val="lt1"/>
-          </a:fontRef>
-        </p:style>
-        <p:txBody>
-          <a:bodyPr rtlCol="0" anchor="ctr"/>
-          <a:lstStyle/>
-          <a:p>
-            <a:pPr algn="ctr"/>
-            <a:endParaRPr kumimoji="1" lang="ja-JP" altLang="en-US"/>
-          </a:p>
-        </p:txBody>
-      </p:sp>
-      <p:sp>
-        <p:nvSpPr>
-          <p:cNvPr id="35" name="テキスト ボックス 34"/>
-          <p:cNvSpPr txBox="1"/>
-          <p:nvPr/>
-        </p:nvSpPr>
-        <p:spPr>
-          <a:xfrm>
-            <a:off x="6207660" y="9095621"/>
-            <a:ext cx="1268643" cy="307777"/>
-          </a:xfrm>
-          <a:prstGeom prst="rect">
-            <a:avLst/>
-          </a:prstGeom>
-          <a:noFill/>
-        </p:spPr>
-        <p:txBody>
-          <a:bodyPr wrap="square" rtlCol="0">
-            <a:spAutoFit/>
-          </a:bodyPr>
-          <a:lstStyle/>
-          <a:p>
-            <a:r>
-              <a:rPr lang="ja-JP" altLang="en-US" sz="1400" dirty="0" smtClean="0"/>
-              <a:t>ゲーム画面</a:t>
-            </a:r>
-            <a:endParaRPr kumimoji="1" lang="ja-JP" altLang="en-US" sz="1400" dirty="0"/>
-          </a:p>
-        </p:txBody>
-      </p:sp>
-      <p:sp>
-        <p:nvSpPr>
-          <p:cNvPr id="36" name="正方形/長方形 35"/>
-          <p:cNvSpPr/>
-          <p:nvPr/>
-        </p:nvSpPr>
-        <p:spPr>
-          <a:xfrm>
-            <a:off x="3141654" y="9095621"/>
-            <a:ext cx="2766894" cy="2844687"/>
-          </a:xfrm>
-          <a:prstGeom prst="rect">
-            <a:avLst/>
-          </a:prstGeom>
-          <a:noFill/>
-          <a:ln>
-            <a:solidFill>
-              <a:schemeClr val="bg1">
-                <a:lumMod val="65000"/>
-              </a:schemeClr>
-            </a:solidFill>
-            <a:prstDash val="dash"/>
-          </a:ln>
-        </p:spPr>
-        <p:style>
-          <a:lnRef idx="2">
-            <a:schemeClr val="accent1">
-              <a:shade val="50000"/>
-            </a:schemeClr>
-          </a:lnRef>
-          <a:fillRef idx="1">
-            <a:schemeClr val="accent1"/>
-          </a:fillRef>
-          <a:effectRef idx="0">
-            <a:schemeClr val="accent1"/>
-          </a:effectRef>
-          <a:fontRef idx="minor">
-            <a:schemeClr val="lt1"/>
-          </a:fontRef>
-        </p:style>
-        <p:txBody>
-          <a:bodyPr rtlCol="0" anchor="ctr"/>
-          <a:lstStyle/>
-          <a:p>
-            <a:pPr algn="ctr"/>
-            <a:endParaRPr kumimoji="1" lang="ja-JP" altLang="en-US"/>
-          </a:p>
-        </p:txBody>
-      </p:sp>
-      <p:sp>
-        <p:nvSpPr>
-          <p:cNvPr id="37" name="角丸四角形 36"/>
-          <p:cNvSpPr/>
-          <p:nvPr/>
-        </p:nvSpPr>
-        <p:spPr>
-          <a:xfrm>
-            <a:off x="4076467" y="10099033"/>
-            <a:ext cx="1294105" cy="674913"/>
-          </a:xfrm>
-          <a:prstGeom prst="roundRect">
-            <a:avLst/>
-          </a:prstGeom>
-        </p:spPr>
-        <p:style>
-          <a:lnRef idx="2">
-            <a:schemeClr val="accent1">
-              <a:shade val="50000"/>
-            </a:schemeClr>
-          </a:lnRef>
-          <a:fillRef idx="1">
-            <a:schemeClr val="accent1"/>
-          </a:fillRef>
-          <a:effectRef idx="0">
-            <a:schemeClr val="accent1"/>
-          </a:effectRef>
-          <a:fontRef idx="minor">
-            <a:schemeClr val="lt1"/>
-          </a:fontRef>
-        </p:style>
-        <p:txBody>
-          <a:bodyPr rtlCol="0" anchor="ctr"/>
-          <a:lstStyle/>
-          <a:p>
-            <a:pPr algn="ctr"/>
-            <a:endParaRPr kumimoji="1" lang="ja-JP" altLang="en-US"/>
-          </a:p>
-        </p:txBody>
-      </p:sp>
-      <p:sp>
-        <p:nvSpPr>
-          <p:cNvPr id="38" name="テキスト ボックス 37"/>
-          <p:cNvSpPr txBox="1"/>
-          <p:nvPr/>
-        </p:nvSpPr>
-        <p:spPr>
-          <a:xfrm>
-            <a:off x="3141653" y="9095621"/>
-            <a:ext cx="1522294" cy="307777"/>
-          </a:xfrm>
-          <a:prstGeom prst="rect">
-            <a:avLst/>
-          </a:prstGeom>
-          <a:noFill/>
-        </p:spPr>
-        <p:txBody>
-          <a:bodyPr wrap="square" rtlCol="0">
-            <a:spAutoFit/>
-          </a:bodyPr>
-          <a:lstStyle/>
-          <a:p>
-            <a:r>
-              <a:rPr lang="ja-JP" altLang="en-US" sz="1400" dirty="0" smtClean="0"/>
-              <a:t>マッチング画面</a:t>
-            </a:r>
-            <a:endParaRPr kumimoji="1" lang="ja-JP" altLang="en-US" sz="1400" dirty="0"/>
-          </a:p>
-        </p:txBody>
-      </p:sp>
-      <p:sp>
-        <p:nvSpPr>
-          <p:cNvPr id="39" name="正方形/長方形 38"/>
-          <p:cNvSpPr/>
-          <p:nvPr/>
-        </p:nvSpPr>
-        <p:spPr>
-          <a:xfrm>
-            <a:off x="75645" y="9095621"/>
-            <a:ext cx="2766894" cy="2844687"/>
-          </a:xfrm>
-          <a:prstGeom prst="rect">
-            <a:avLst/>
-          </a:prstGeom>
-          <a:noFill/>
-          <a:ln>
-            <a:solidFill>
-              <a:schemeClr val="bg1">
-                <a:lumMod val="65000"/>
-              </a:schemeClr>
-            </a:solidFill>
-            <a:prstDash val="dash"/>
-          </a:ln>
-        </p:spPr>
-        <p:style>
-          <a:lnRef idx="2">
-            <a:schemeClr val="accent1">
-              <a:shade val="50000"/>
-            </a:schemeClr>
-          </a:lnRef>
-          <a:fillRef idx="1">
-            <a:schemeClr val="accent1"/>
-          </a:fillRef>
-          <a:effectRef idx="0">
-            <a:schemeClr val="accent1"/>
-          </a:effectRef>
-          <a:fontRef idx="minor">
-            <a:schemeClr val="lt1"/>
-          </a:fontRef>
-        </p:style>
-        <p:txBody>
-          <a:bodyPr rtlCol="0" anchor="ctr"/>
-          <a:lstStyle/>
-          <a:p>
-            <a:pPr algn="ctr"/>
-            <a:endParaRPr kumimoji="1" lang="ja-JP" altLang="en-US"/>
-          </a:p>
-        </p:txBody>
-      </p:sp>
-      <p:sp>
-        <p:nvSpPr>
-          <p:cNvPr id="40" name="角丸四角形 39"/>
-          <p:cNvSpPr/>
-          <p:nvPr/>
-        </p:nvSpPr>
-        <p:spPr>
-          <a:xfrm>
-            <a:off x="1010458" y="10099033"/>
-            <a:ext cx="1294105" cy="674913"/>
-          </a:xfrm>
-          <a:prstGeom prst="roundRect">
-            <a:avLst/>
-          </a:prstGeom>
-        </p:spPr>
-        <p:style>
-          <a:lnRef idx="2">
-            <a:schemeClr val="accent1">
-              <a:shade val="50000"/>
-            </a:schemeClr>
-          </a:lnRef>
-          <a:fillRef idx="1">
-            <a:schemeClr val="accent1"/>
-          </a:fillRef>
-          <a:effectRef idx="0">
-            <a:schemeClr val="accent1"/>
-          </a:effectRef>
-          <a:fontRef idx="minor">
-            <a:schemeClr val="lt1"/>
-          </a:fontRef>
-        </p:style>
-        <p:txBody>
-          <a:bodyPr rtlCol="0" anchor="ctr"/>
-          <a:lstStyle/>
-          <a:p>
-            <a:pPr algn="ctr"/>
-            <a:endParaRPr kumimoji="1" lang="ja-JP" altLang="en-US"/>
-          </a:p>
-        </p:txBody>
-      </p:sp>
-      <p:sp>
-        <p:nvSpPr>
-          <p:cNvPr id="41" name="テキスト ボックス 40"/>
-          <p:cNvSpPr txBox="1"/>
-          <p:nvPr/>
-        </p:nvSpPr>
-        <p:spPr>
-          <a:xfrm>
-            <a:off x="75644" y="9095621"/>
-            <a:ext cx="1522294" cy="307777"/>
-          </a:xfrm>
-          <a:prstGeom prst="rect">
-            <a:avLst/>
-          </a:prstGeom>
-          <a:noFill/>
-        </p:spPr>
-        <p:txBody>
-          <a:bodyPr wrap="square" rtlCol="0">
-            <a:spAutoFit/>
-          </a:bodyPr>
-          <a:lstStyle/>
-          <a:p>
-            <a:r>
-              <a:rPr lang="ja-JP" altLang="en-US" sz="1400" dirty="0" smtClean="0"/>
-              <a:t>ガチャ画面</a:t>
-            </a:r>
-            <a:endParaRPr kumimoji="1" lang="ja-JP" altLang="en-US" sz="1400" dirty="0"/>
-          </a:p>
-        </p:txBody>
-      </p:sp>
-      <p:sp>
-        <p:nvSpPr>
-          <p:cNvPr id="3" name="テキスト ボックス 2"/>
-          <p:cNvSpPr txBox="1"/>
-          <p:nvPr/>
-        </p:nvSpPr>
-        <p:spPr>
-          <a:xfrm>
-            <a:off x="141515" y="401108"/>
-            <a:ext cx="1569660" cy="369332"/>
-          </a:xfrm>
-          <a:prstGeom prst="rect">
-            <a:avLst/>
-          </a:prstGeom>
-          <a:noFill/>
-        </p:spPr>
-        <p:txBody>
-          <a:bodyPr wrap="none" rtlCol="0">
-            <a:spAutoFit/>
-          </a:bodyPr>
-          <a:lstStyle/>
-          <a:p>
-            <a:r>
-              <a:rPr kumimoji="1" lang="ja-JP" altLang="en-US" smtClean="0"/>
-              <a:t>タイトル画面</a:t>
-            </a:r>
-            <a:endParaRPr kumimoji="1" lang="ja-JP" altLang="en-US"/>
-          </a:p>
-        </p:txBody>
-      </p:sp>
-      <p:sp>
-        <p:nvSpPr>
-          <p:cNvPr id="5" name="角丸四角形 4"/>
-          <p:cNvSpPr/>
-          <p:nvPr/>
-        </p:nvSpPr>
-        <p:spPr>
-          <a:xfrm>
-            <a:off x="391593" y="1281409"/>
-            <a:ext cx="890395" cy="324969"/>
-          </a:xfrm>
-          <a:prstGeom prst="roundRect">
-            <a:avLst/>
-          </a:prstGeom>
-        </p:spPr>
-        <p:style>
-          <a:lnRef idx="2">
-            <a:schemeClr val="dk1"/>
-          </a:lnRef>
-          <a:fillRef idx="1">
-            <a:schemeClr val="lt1"/>
-          </a:fillRef>
-          <a:effectRef idx="0">
-            <a:schemeClr val="dk1"/>
-          </a:effectRef>
-          <a:fontRef idx="minor">
-            <a:schemeClr val="dk1"/>
-          </a:fontRef>
-        </p:style>
-        <p:txBody>
-          <a:bodyPr rtlCol="0" anchor="ctr"/>
-          <a:lstStyle/>
-          <a:p>
-            <a:pPr algn="ctr"/>
-            <a:r>
-              <a:rPr lang="en-US" altLang="ja-JP" sz="1600"/>
-              <a:t>u</a:t>
-            </a:r>
-            <a:r>
-              <a:rPr lang="en-US" altLang="ja-JP" sz="1600" smtClean="0"/>
-              <a:t>nity</a:t>
-            </a:r>
-            <a:endParaRPr kumimoji="1" lang="ja-JP" altLang="en-US" sz="1600" dirty="0"/>
-          </a:p>
-        </p:txBody>
-      </p:sp>
-      <p:sp>
-        <p:nvSpPr>
-          <p:cNvPr id="107" name="角丸四角形 106"/>
-          <p:cNvSpPr/>
-          <p:nvPr/>
-        </p:nvSpPr>
-        <p:spPr>
-          <a:xfrm>
-            <a:off x="1657510" y="1281409"/>
-            <a:ext cx="890395" cy="324969"/>
-          </a:xfrm>
-          <a:prstGeom prst="roundRect">
-            <a:avLst/>
-          </a:prstGeom>
-        </p:spPr>
-        <p:style>
-          <a:lnRef idx="2">
-            <a:schemeClr val="dk1"/>
-          </a:lnRef>
-          <a:fillRef idx="1">
-            <a:schemeClr val="lt1"/>
-          </a:fillRef>
-          <a:effectRef idx="0">
-            <a:schemeClr val="dk1"/>
-          </a:effectRef>
-          <a:fontRef idx="minor">
-            <a:schemeClr val="dk1"/>
-          </a:fontRef>
-        </p:style>
-        <p:txBody>
-          <a:bodyPr rtlCol="0" anchor="ctr"/>
-          <a:lstStyle/>
-          <a:p>
-            <a:pPr algn="ctr"/>
-            <a:r>
-              <a:rPr lang="en-US" altLang="ja-JP" sz="1600" dirty="0" smtClean="0"/>
-              <a:t>rails</a:t>
-            </a:r>
-            <a:endParaRPr kumimoji="1" lang="ja-JP" altLang="en-US" sz="1600" dirty="0"/>
-          </a:p>
-        </p:txBody>
-      </p:sp>
-      <p:sp>
-        <p:nvSpPr>
-          <p:cNvPr id="116" name="角丸四角形 115"/>
-          <p:cNvSpPr/>
-          <p:nvPr/>
-        </p:nvSpPr>
-        <p:spPr>
-          <a:xfrm>
-            <a:off x="2842539" y="1281409"/>
-            <a:ext cx="890395" cy="324969"/>
-          </a:xfrm>
-          <a:prstGeom prst="roundRect">
-            <a:avLst/>
-          </a:prstGeom>
-        </p:spPr>
-        <p:style>
-          <a:lnRef idx="2">
-            <a:schemeClr val="dk1"/>
-          </a:lnRef>
-          <a:fillRef idx="1">
-            <a:schemeClr val="lt1"/>
-          </a:fillRef>
-          <a:effectRef idx="0">
-            <a:schemeClr val="dk1"/>
-          </a:effectRef>
-          <a:fontRef idx="minor">
-            <a:schemeClr val="dk1"/>
-          </a:fontRef>
-        </p:style>
-        <p:txBody>
-          <a:bodyPr rtlCol="0" anchor="ctr"/>
-          <a:lstStyle/>
-          <a:p>
-            <a:pPr algn="ctr"/>
-            <a:r>
-              <a:rPr lang="en-US" altLang="ja-JP" sz="1600" dirty="0" smtClean="0"/>
-              <a:t>DB</a:t>
-            </a:r>
-            <a:endParaRPr kumimoji="1" lang="ja-JP" altLang="en-US" sz="1600" dirty="0"/>
-          </a:p>
-        </p:txBody>
-      </p:sp>
-      <p:sp>
-        <p:nvSpPr>
-          <p:cNvPr id="117" name="テキスト ボックス 116"/>
-          <p:cNvSpPr txBox="1"/>
-          <p:nvPr/>
-        </p:nvSpPr>
-        <p:spPr>
-          <a:xfrm>
-            <a:off x="1471765" y="779703"/>
-            <a:ext cx="1261884" cy="307777"/>
-          </a:xfrm>
-          <a:prstGeom prst="rect">
-            <a:avLst/>
-          </a:prstGeom>
-          <a:noFill/>
-        </p:spPr>
-        <p:txBody>
-          <a:bodyPr wrap="none" rtlCol="0">
-            <a:spAutoFit/>
-          </a:bodyPr>
-          <a:lstStyle/>
-          <a:p>
-            <a:r>
-              <a:rPr lang="ja-JP" altLang="en-US" sz="1400" smtClean="0"/>
-              <a:t>ログイン処理</a:t>
-            </a:r>
-            <a:endParaRPr kumimoji="1" lang="ja-JP" altLang="en-US" sz="1400" dirty="0"/>
+              <a:rPr lang="en-US" altLang="ja-JP" sz="1400" dirty="0" smtClean="0">
+                <a:solidFill>
+                  <a:schemeClr val="bg1"/>
+                </a:solidFill>
+              </a:rPr>
+              <a:t>Player2</a:t>
+            </a:r>
+            <a:endParaRPr kumimoji="1" lang="ja-JP" altLang="en-US" sz="1400" dirty="0">
+              <a:solidFill>
+                <a:schemeClr val="bg1"/>
+              </a:solidFill>
+            </a:endParaRPr>
           </a:p>
         </p:txBody>
       </p:sp>
       <p:cxnSp>
         <p:nvCxnSpPr>
-          <p:cNvPr id="9" name="直線コネクタ 8"/>
-          <p:cNvCxnSpPr>
-            <a:stCxn id="5" idx="2"/>
-          </p:cNvCxnSpPr>
+          <p:cNvPr id="58" name="直線矢印コネクタ 57"/>
+          <p:cNvCxnSpPr/>
           <p:nvPr/>
         </p:nvCxnSpPr>
         <p:spPr>
           <a:xfrm flipH="1">
-            <a:off x="827903" y="1606378"/>
-            <a:ext cx="8888" cy="4819136"/>
-          </a:xfrm>
-          <a:prstGeom prst="line">
-            <a:avLst/>
-          </a:prstGeom>
-          <a:ln>
-            <a:solidFill>
-              <a:schemeClr val="tx1">
-                <a:lumMod val="75000"/>
-                <a:lumOff val="25000"/>
-              </a:schemeClr>
-            </a:solidFill>
-            <a:prstDash val="dash"/>
+            <a:off x="8535047" y="2700126"/>
+            <a:ext cx="894214" cy="794518"/>
+          </a:xfrm>
+          <a:prstGeom prst="straightConnector1">
+            <a:avLst/>
+          </a:prstGeom>
+          <a:ln w="76200">
+            <a:tailEnd type="triangle"/>
           </a:ln>
         </p:spPr>
         <p:style>
@@ -10322,267 +9782,10 @@
           </a:fontRef>
         </p:style>
       </p:cxnSp>
-      <p:cxnSp>
-        <p:nvCxnSpPr>
-          <p:cNvPr id="118" name="直線コネクタ 117"/>
-          <p:cNvCxnSpPr/>
-          <p:nvPr/>
-        </p:nvCxnSpPr>
-        <p:spPr>
-          <a:xfrm flipH="1">
-            <a:off x="2093819" y="1631214"/>
-            <a:ext cx="8888" cy="4697415"/>
-          </a:xfrm>
-          <a:prstGeom prst="line">
-            <a:avLst/>
-          </a:prstGeom>
-          <a:ln>
-            <a:solidFill>
-              <a:schemeClr val="tx1">
-                <a:lumMod val="75000"/>
-                <a:lumOff val="25000"/>
-              </a:schemeClr>
-            </a:solidFill>
-            <a:prstDash val="dash"/>
-          </a:ln>
-        </p:spPr>
-        <p:style>
-          <a:lnRef idx="1">
-            <a:schemeClr val="accent1"/>
-          </a:lnRef>
-          <a:fillRef idx="0">
-            <a:schemeClr val="accent1"/>
-          </a:fillRef>
-          <a:effectRef idx="0">
-            <a:schemeClr val="accent1"/>
-          </a:effectRef>
-          <a:fontRef idx="minor">
-            <a:schemeClr val="tx1"/>
-          </a:fontRef>
-        </p:style>
-      </p:cxnSp>
-      <p:cxnSp>
-        <p:nvCxnSpPr>
-          <p:cNvPr id="119" name="直線コネクタ 118"/>
-          <p:cNvCxnSpPr/>
-          <p:nvPr/>
-        </p:nvCxnSpPr>
-        <p:spPr>
-          <a:xfrm flipH="1">
-            <a:off x="3287736" y="1631215"/>
-            <a:ext cx="8888" cy="4697415"/>
-          </a:xfrm>
-          <a:prstGeom prst="line">
-            <a:avLst/>
-          </a:prstGeom>
-          <a:ln>
-            <a:solidFill>
-              <a:schemeClr val="tx1">
-                <a:lumMod val="75000"/>
-                <a:lumOff val="25000"/>
-              </a:schemeClr>
-            </a:solidFill>
-            <a:prstDash val="dash"/>
-          </a:ln>
-        </p:spPr>
-        <p:style>
-          <a:lnRef idx="1">
-            <a:schemeClr val="accent1"/>
-          </a:lnRef>
-          <a:fillRef idx="0">
-            <a:schemeClr val="accent1"/>
-          </a:fillRef>
-          <a:effectRef idx="0">
-            <a:schemeClr val="accent1"/>
-          </a:effectRef>
-          <a:fontRef idx="minor">
-            <a:schemeClr val="tx1"/>
-          </a:fontRef>
-        </p:style>
-      </p:cxnSp>
-      <p:cxnSp>
-        <p:nvCxnSpPr>
-          <p:cNvPr id="12" name="直線矢印コネクタ 11"/>
-          <p:cNvCxnSpPr/>
-          <p:nvPr/>
-        </p:nvCxnSpPr>
-        <p:spPr>
-          <a:xfrm>
-            <a:off x="836790" y="1915298"/>
-            <a:ext cx="1152648" cy="0"/>
-          </a:xfrm>
-          <a:prstGeom prst="straightConnector1">
-            <a:avLst/>
-          </a:prstGeom>
-          <a:ln>
-            <a:solidFill>
-              <a:schemeClr val="tx1">
-                <a:lumMod val="75000"/>
-                <a:lumOff val="25000"/>
-              </a:schemeClr>
-            </a:solidFill>
-            <a:tailEnd type="triangle"/>
-          </a:ln>
-        </p:spPr>
-        <p:style>
-          <a:lnRef idx="1">
-            <a:schemeClr val="accent1"/>
-          </a:lnRef>
-          <a:fillRef idx="0">
-            <a:schemeClr val="accent1"/>
-          </a:fillRef>
-          <a:effectRef idx="0">
-            <a:schemeClr val="accent1"/>
-          </a:effectRef>
-          <a:fontRef idx="minor">
-            <a:schemeClr val="tx1"/>
-          </a:fontRef>
-        </p:style>
-      </p:cxnSp>
-      <p:sp>
-        <p:nvSpPr>
-          <p:cNvPr id="13" name="テキスト ボックス 12"/>
-          <p:cNvSpPr txBox="1"/>
-          <p:nvPr/>
-        </p:nvSpPr>
-        <p:spPr>
-          <a:xfrm>
-            <a:off x="972119" y="1746446"/>
-            <a:ext cx="867545" cy="415498"/>
-          </a:xfrm>
-          <a:prstGeom prst="rect">
-            <a:avLst/>
-          </a:prstGeom>
-          <a:solidFill>
-            <a:schemeClr val="bg1"/>
-          </a:solidFill>
-          <a:ln>
-            <a:solidFill>
-              <a:schemeClr val="tx1">
-                <a:lumMod val="50000"/>
-                <a:lumOff val="50000"/>
-              </a:schemeClr>
-            </a:solidFill>
-          </a:ln>
-        </p:spPr>
-        <p:txBody>
-          <a:bodyPr wrap="none" rtlCol="0">
-            <a:spAutoFit/>
-          </a:bodyPr>
-          <a:lstStyle/>
-          <a:p>
-            <a:r>
-              <a:rPr kumimoji="1" lang="ja-JP" altLang="en-US" sz="1000" dirty="0" smtClean="0"/>
-              <a:t>ログイン</a:t>
-            </a:r>
-            <a:endParaRPr kumimoji="1" lang="en-US" altLang="ja-JP" sz="1000" dirty="0" smtClean="0"/>
-          </a:p>
-          <a:p>
-            <a:r>
-              <a:rPr lang="en-US" altLang="ja-JP" sz="1000" dirty="0" smtClean="0"/>
-              <a:t>[device_id]</a:t>
-            </a:r>
-            <a:endParaRPr kumimoji="1" lang="ja-JP" altLang="en-US" sz="1000" dirty="0"/>
-          </a:p>
-        </p:txBody>
-      </p:sp>
-      <p:cxnSp>
-        <p:nvCxnSpPr>
-          <p:cNvPr id="120" name="直線矢印コネクタ 119"/>
-          <p:cNvCxnSpPr/>
-          <p:nvPr/>
-        </p:nvCxnSpPr>
-        <p:spPr>
-          <a:xfrm>
-            <a:off x="2126120" y="2055367"/>
-            <a:ext cx="1152648" cy="0"/>
-          </a:xfrm>
-          <a:prstGeom prst="straightConnector1">
-            <a:avLst/>
-          </a:prstGeom>
-          <a:ln>
-            <a:solidFill>
-              <a:schemeClr val="tx1">
-                <a:lumMod val="75000"/>
-                <a:lumOff val="25000"/>
-              </a:schemeClr>
-            </a:solidFill>
-            <a:tailEnd type="triangle"/>
-          </a:ln>
-        </p:spPr>
-        <p:style>
-          <a:lnRef idx="1">
-            <a:schemeClr val="accent1"/>
-          </a:lnRef>
-          <a:fillRef idx="0">
-            <a:schemeClr val="accent1"/>
-          </a:fillRef>
-          <a:effectRef idx="0">
-            <a:schemeClr val="accent1"/>
-          </a:effectRef>
-          <a:fontRef idx="minor">
-            <a:schemeClr val="tx1"/>
-          </a:fontRef>
-        </p:style>
-      </p:cxnSp>
-      <p:sp>
-        <p:nvSpPr>
-          <p:cNvPr id="121" name="テキスト ボックス 120"/>
-          <p:cNvSpPr txBox="1"/>
-          <p:nvPr/>
-        </p:nvSpPr>
-        <p:spPr>
-          <a:xfrm>
-            <a:off x="2187546" y="1762990"/>
-            <a:ext cx="954107" cy="553998"/>
-          </a:xfrm>
-          <a:prstGeom prst="rect">
-            <a:avLst/>
-          </a:prstGeom>
-          <a:solidFill>
-            <a:schemeClr val="bg1"/>
-          </a:solidFill>
-          <a:ln>
-            <a:solidFill>
-              <a:schemeClr val="tx1">
-                <a:lumMod val="50000"/>
-                <a:lumOff val="50000"/>
-              </a:schemeClr>
-            </a:solidFill>
-          </a:ln>
-        </p:spPr>
-        <p:txBody>
-          <a:bodyPr wrap="none" rtlCol="0">
-            <a:spAutoFit/>
-          </a:bodyPr>
-          <a:lstStyle/>
-          <a:p>
-            <a:r>
-              <a:rPr lang="ja-JP" altLang="en-US" sz="1000" dirty="0" smtClean="0"/>
-              <a:t>初回なら</a:t>
-            </a:r>
-            <a:endParaRPr lang="en-US" altLang="ja-JP" sz="1000" dirty="0" smtClean="0"/>
-          </a:p>
-          <a:p>
-            <a:r>
-              <a:rPr lang="ja-JP" altLang="en-US" sz="1000" dirty="0" smtClean="0"/>
-              <a:t>レコード作成</a:t>
-            </a:r>
-            <a:endParaRPr kumimoji="1" lang="en-US" altLang="ja-JP" sz="1000" dirty="0" smtClean="0"/>
-          </a:p>
-          <a:p>
-            <a:r>
-              <a:rPr lang="en-US" altLang="ja-JP" sz="1000" dirty="0" smtClean="0"/>
-              <a:t>[device_id]</a:t>
-            </a:r>
-            <a:endParaRPr kumimoji="1" lang="ja-JP" altLang="en-US" sz="1000" dirty="0"/>
-          </a:p>
-        </p:txBody>
-      </p:sp>
     </p:spTree>
     <p:extLst>
       <p:ext uri="{BB962C8B-B14F-4D97-AF65-F5344CB8AC3E}">
-        <p14:creationId xmlns:p14="http://schemas.microsoft.com/office/powerpoint/2010/main" val="190900666"/>
+        <p14:creationId xmlns:p14="http://schemas.microsoft.com/office/powerpoint/2010/main" val="289858649"/>
       </p:ext>
     </p:extLst>
   </p:cSld>

</xml_diff>